<commit_message>
Re #1802 last modification for URC design implementation
</commit_message>
<xml_diff>
--- a/documentation/presentations/Large_number_of_small_cuts.pptx
+++ b/documentation/presentations/Large_number_of_small_cuts.pptx
@@ -23,13 +23,14 @@
     <p:sldId id="277" r:id="rId17"/>
     <p:sldId id="281" r:id="rId18"/>
     <p:sldId id="270" r:id="rId19"/>
-    <p:sldId id="278" r:id="rId20"/>
-    <p:sldId id="271" r:id="rId21"/>
-    <p:sldId id="280" r:id="rId22"/>
-    <p:sldId id="272" r:id="rId23"/>
-    <p:sldId id="274" r:id="rId24"/>
-    <p:sldId id="279" r:id="rId25"/>
-    <p:sldId id="275" r:id="rId26"/>
+    <p:sldId id="282" r:id="rId20"/>
+    <p:sldId id="278" r:id="rId21"/>
+    <p:sldId id="271" r:id="rId22"/>
+    <p:sldId id="280" r:id="rId23"/>
+    <p:sldId id="272" r:id="rId24"/>
+    <p:sldId id="274" r:id="rId25"/>
+    <p:sldId id="279" r:id="rId26"/>
+    <p:sldId id="275" r:id="rId27"/>
   </p:sldIdLst>
   <p:sldSz cx="12192000" cy="6858000"/>
   <p:notesSz cx="6858000" cy="9144000"/>
@@ -129,6 +130,48 @@
     </a:lvl9pPr>
   </p:defaultTextStyle>
   <p:extLst>
+    <p:ext uri="{521415D9-36F7-43E2-AB2F-B90AF26B5E84}">
+      <p14:sectionLst xmlns:p14="http://schemas.microsoft.com/office/powerpoint/2010/main">
+        <p14:section name="Default Section" id="{7255B0DC-2246-4BD3-B718-6F3CA01A0AD6}">
+          <p14:sldIdLst>
+            <p14:sldId id="256"/>
+          </p14:sldIdLst>
+        </p14:section>
+        <p14:section name="Presentation Day1" id="{D7F28201-9E31-4677-93C4-FAD915D83E38}">
+          <p14:sldIdLst>
+            <p14:sldId id="260"/>
+            <p14:sldId id="257"/>
+            <p14:sldId id="258"/>
+            <p14:sldId id="259"/>
+            <p14:sldId id="262"/>
+            <p14:sldId id="268"/>
+            <p14:sldId id="261"/>
+            <p14:sldId id="263"/>
+            <p14:sldId id="264"/>
+            <p14:sldId id="265"/>
+            <p14:sldId id="266"/>
+            <p14:sldId id="267"/>
+          </p14:sldIdLst>
+        </p14:section>
+        <p14:section name="Presentation Day2" id="{EAE315A5-92FB-465E-A7FA-BD37C3A9E877}">
+          <p14:sldIdLst>
+            <p14:sldId id="269"/>
+            <p14:sldId id="276"/>
+            <p14:sldId id="277"/>
+            <p14:sldId id="281"/>
+            <p14:sldId id="270"/>
+            <p14:sldId id="282"/>
+            <p14:sldId id="278"/>
+            <p14:sldId id="271"/>
+            <p14:sldId id="280"/>
+            <p14:sldId id="272"/>
+            <p14:sldId id="274"/>
+            <p14:sldId id="279"/>
+            <p14:sldId id="275"/>
+          </p14:sldIdLst>
+        </p14:section>
+      </p14:sectionLst>
+    </p:ext>
     <p:ext uri="{EFAFB233-063F-42B5-8137-9DF3F51BA10A}">
       <p15:sldGuideLst xmlns:p15="http://schemas.microsoft.com/office/powerpoint/2012/main"/>
     </p:ext>
@@ -4120,7 +4163,7 @@
           <a:noFill/>
           <a:ln>
             <a:solidFill>
-              <a:srgbClr val="FFC000"/>
+              <a:srgbClr val="0066FF"/>
             </a:solidFill>
           </a:ln>
         </p:spPr>
@@ -4281,7 +4324,7 @@
           <a:noFill/>
           <a:ln>
             <a:solidFill>
-              <a:srgbClr val="C00000"/>
+              <a:srgbClr val="00B050"/>
             </a:solidFill>
           </a:ln>
         </p:spPr>
@@ -13060,15 +13103,7 @@
             </a:pPr>
             <a:r>
               <a:rPr lang="en-GB" dirty="0"/>
-              <a:t>s</a:t>
-            </a:r>
-            <a:r>
-              <a:rPr lang="en-GB"/>
-              <a:t>erializable</a:t>
-            </a:r>
-            <a:r>
-              <a:rPr lang="en-GB" dirty="0"/>
-              <a:t>:</a:t>
+              <a:t>serializable:</a:t>
             </a:r>
             <a:endParaRPr lang="en-GB" dirty="0">
               <a:solidFill>
@@ -13735,7 +13770,7 @@
         <p:cNvPr id="1" name="">
           <a:extLst>
             <a:ext uri="{FF2B5EF4-FFF2-40B4-BE49-F238E27FC236}">
-              <a16:creationId xmlns:a16="http://schemas.microsoft.com/office/drawing/2014/main" id="{259DA183-24F6-6400-C510-5E43E0F65E4E}"/>
+              <a16:creationId xmlns:a16="http://schemas.microsoft.com/office/drawing/2014/main" id="{A79E9AA6-4602-97FD-E4C1-A34BECA8DE78}"/>
             </a:ext>
           </a:extLst>
         </p:cNvPr>
@@ -13755,7 +13790,7 @@
           <p:cNvPr id="2" name="Title 1">
             <a:extLst>
               <a:ext uri="{FF2B5EF4-FFF2-40B4-BE49-F238E27FC236}">
-                <a16:creationId xmlns:a16="http://schemas.microsoft.com/office/drawing/2014/main" id="{D624607A-D87C-4FEB-75EB-39CCE5542C9E}"/>
+                <a16:creationId xmlns:a16="http://schemas.microsoft.com/office/drawing/2014/main" id="{2FBB2C34-6994-8268-5001-423EE11C606F}"/>
               </a:ext>
             </a:extLst>
           </p:cNvPr>
@@ -13766,13 +13801,19 @@
             <p:ph type="title"/>
           </p:nvPr>
         </p:nvSpPr>
-        <p:spPr/>
+        <p:spPr>
+          <a:xfrm>
+            <a:off x="838200" y="365125"/>
+            <a:ext cx="10515600" cy="1064495"/>
+          </a:xfrm>
+        </p:spPr>
         <p:txBody>
           <a:bodyPr>
             <a:normAutofit/>
           </a:bodyPr>
           <a:lstStyle/>
           <a:p>
+            <a:pPr algn="ctr"/>
             <a:r>
               <a:rPr lang="en-GB" sz="3600" dirty="0">
                 <a:solidFill>
@@ -13787,61 +13828,17 @@
                   <a:srgbClr val="7030A0"/>
                 </a:solidFill>
               </a:rPr>
-              <a:t>#1791 </a:t>
-            </a:r>
-            <a:br>
-              <a:rPr lang="en-GB" sz="3600" dirty="0">
-                <a:solidFill>
-                  <a:srgbClr val="7030A0"/>
-                </a:solidFill>
-              </a:rPr>
-            </a:br>
-            <a:r>
-              <a:rPr lang="en-GB" sz="2000" dirty="0"/>
-              <a:t>The storage and </a:t>
-            </a:r>
-            <a:r>
-              <a:rPr lang="en-GB" sz="2000" dirty="0" err="1">
-                <a:solidFill>
-                  <a:schemeClr val="accent6">
-                    <a:lumMod val="75000"/>
-                  </a:schemeClr>
-                </a:solidFill>
-                <a:latin typeface="Courier New" panose="02070309020205020404" pitchFamily="49" charset="0"/>
-                <a:cs typeface="Courier New" panose="02070309020205020404" pitchFamily="49" charset="0"/>
-              </a:rPr>
-              <a:t>unique_references_contanter</a:t>
-            </a:r>
-            <a:r>
-              <a:rPr lang="en-GB" sz="2000" dirty="0">
-                <a:solidFill>
-                  <a:schemeClr val="accent6">
-                    <a:lumMod val="75000"/>
-                  </a:schemeClr>
-                </a:solidFill>
-                <a:latin typeface="Courier New" panose="02070309020205020404" pitchFamily="49" charset="0"/>
-                <a:cs typeface="Courier New" panose="02070309020205020404" pitchFamily="49" charset="0"/>
-              </a:rPr>
-              <a:t> </a:t>
-            </a:r>
-            <a:r>
-              <a:rPr lang="en-GB" sz="2000" dirty="0"/>
-              <a:t>are mixed together, despite having different purposes.</a:t>
-            </a:r>
-            <a:endParaRPr lang="en-GB" sz="3600" dirty="0">
-              <a:solidFill>
-                <a:srgbClr val="7030A0"/>
-              </a:solidFill>
-            </a:endParaRPr>
+              <a:t>#1791</a:t>
+            </a:r>
           </a:p>
         </p:txBody>
       </p:sp>
       <p:sp>
         <p:nvSpPr>
-          <p:cNvPr id="10" name="Content Placeholder 9">
-            <a:extLst>
-              <a:ext uri="{FF2B5EF4-FFF2-40B4-BE49-F238E27FC236}">
-                <a16:creationId xmlns:a16="http://schemas.microsoft.com/office/drawing/2014/main" id="{AE0D1BE9-ED49-5580-E5E6-99B240780392}"/>
+          <p:cNvPr id="3" name="Content Placeholder 2">
+            <a:extLst>
+              <a:ext uri="{FF2B5EF4-FFF2-40B4-BE49-F238E27FC236}">
+                <a16:creationId xmlns:a16="http://schemas.microsoft.com/office/drawing/2014/main" id="{EC6DBF2C-1355-C94C-5AA1-0699485B64D5}"/>
               </a:ext>
             </a:extLst>
           </p:cNvPr>
@@ -13849,698 +13846,618 @@
             <a:spLocks noGrp="1"/>
           </p:cNvSpPr>
           <p:nvPr>
-            <p:ph sz="half" idx="1"/>
+            <p:ph idx="1"/>
           </p:nvPr>
         </p:nvSpPr>
         <p:spPr>
           <a:xfrm>
-            <a:off x="907907" y="1690688"/>
-            <a:ext cx="9937779" cy="2176413"/>
-          </a:xfrm>
-          <a:ln w="25400">
-            <a:solidFill>
-              <a:srgbClr val="C00000"/>
-            </a:solidFill>
-          </a:ln>
+            <a:off x="643252" y="1338255"/>
+            <a:ext cx="10515600" cy="931500"/>
+          </a:xfrm>
         </p:spPr>
         <p:txBody>
           <a:bodyPr>
-            <a:normAutofit/>
+            <a:normAutofit fontScale="85000" lnSpcReduction="10000"/>
           </a:bodyPr>
           <a:lstStyle/>
           <a:p>
-            <a:pPr marL="0" indent="0">
-              <a:buNone/>
+            <a:pPr marL="457200" indent="-457200">
+              <a:buFont typeface="+mj-lt"/>
+              <a:buAutoNum type="arabicPeriod"/>
             </a:pPr>
             <a:r>
-              <a:rPr lang="en-GB" sz="1900" b="0" i="0" dirty="0" err="1">
-                <a:effectLst/>
-                <a:latin typeface="Courier New" panose="02070309020205020404" pitchFamily="49" charset="0"/>
-                <a:cs typeface="Courier New" panose="02070309020205020404" pitchFamily="49" charset="0"/>
-              </a:rPr>
-              <a:t>glcont</a:t>
-            </a:r>
-            <a:r>
-              <a:rPr lang="en-GB" sz="1900" b="0" i="0" dirty="0">
-                <a:effectLst/>
-                <a:latin typeface="Courier New" panose="02070309020205020404" pitchFamily="49" charset="0"/>
-                <a:cs typeface="Courier New" panose="02070309020205020404" pitchFamily="49" charset="0"/>
-              </a:rPr>
-              <a:t> = </a:t>
-            </a:r>
-            <a:r>
-              <a:rPr lang="en-GB" sz="1900" b="0" i="0" dirty="0" err="1">
-                <a:effectLst/>
-                <a:latin typeface="Courier New" panose="02070309020205020404" pitchFamily="49" charset="0"/>
-                <a:cs typeface="Courier New" panose="02070309020205020404" pitchFamily="49" charset="0"/>
-              </a:rPr>
-              <a:t>self.global_container</a:t>
-            </a:r>
-            <a:r>
-              <a:rPr lang="en-GB" sz="1900" b="0" i="0" dirty="0">
-                <a:effectLst/>
-                <a:latin typeface="Courier New" panose="02070309020205020404" pitchFamily="49" charset="0"/>
-                <a:cs typeface="Courier New" panose="02070309020205020404" pitchFamily="49" charset="0"/>
-              </a:rPr>
-              <a:t>(</a:t>
-            </a:r>
-            <a:r>
-              <a:rPr lang="en-GB" sz="1900" b="0" i="0" dirty="0">
-                <a:solidFill>
-                  <a:srgbClr val="A709F5"/>
-                </a:solidFill>
-                <a:effectLst/>
-                <a:latin typeface="Courier New" panose="02070309020205020404" pitchFamily="49" charset="0"/>
-                <a:cs typeface="Courier New" panose="02070309020205020404" pitchFamily="49" charset="0"/>
-              </a:rPr>
-              <a:t>'value'</a:t>
-            </a:r>
-            <a:r>
-              <a:rPr lang="en-GB" sz="1900" b="0" i="0" dirty="0">
-                <a:effectLst/>
-                <a:latin typeface="Courier New" panose="02070309020205020404" pitchFamily="49" charset="0"/>
-                <a:cs typeface="Courier New" panose="02070309020205020404" pitchFamily="49" charset="0"/>
-              </a:rPr>
-              <a:t>, </a:t>
-            </a:r>
-            <a:r>
-              <a:rPr lang="en-GB" sz="1900" b="0" i="0" dirty="0" err="1">
-                <a:effectLst/>
-                <a:latin typeface="Courier New" panose="02070309020205020404" pitchFamily="49" charset="0"/>
-                <a:cs typeface="Courier New" panose="02070309020205020404" pitchFamily="49" charset="0"/>
-              </a:rPr>
-              <a:t>self.global_name</a:t>
-            </a:r>
-            <a:r>
-              <a:rPr lang="en-GB" sz="1900" b="0" i="0" dirty="0">
-                <a:effectLst/>
-                <a:latin typeface="Courier New" panose="02070309020205020404" pitchFamily="49" charset="0"/>
-                <a:cs typeface="Courier New" panose="02070309020205020404" pitchFamily="49" charset="0"/>
-              </a:rPr>
-              <a:t>_);</a:t>
-            </a:r>
-          </a:p>
-          <a:p>
-            <a:pPr marL="0" indent="0">
-              <a:buNone/>
-            </a:pPr>
-            <a:r>
-              <a:rPr lang="en-GB" sz="1900" dirty="0">
-                <a:latin typeface="Courier New" panose="02070309020205020404" pitchFamily="49" charset="0"/>
-                <a:cs typeface="Courier New" panose="02070309020205020404" pitchFamily="49" charset="0"/>
-              </a:rPr>
-              <a:t>…</a:t>
-            </a:r>
-          </a:p>
-          <a:p>
-            <a:pPr marL="0" indent="0">
-              <a:buNone/>
-            </a:pPr>
-            <a:r>
-              <a:rPr lang="en-GB" sz="1900" b="0" i="0" dirty="0">
-                <a:effectLst/>
-                <a:latin typeface="Courier New" panose="02070309020205020404" pitchFamily="49" charset="0"/>
-                <a:cs typeface="Courier New" panose="02070309020205020404" pitchFamily="49" charset="0"/>
-              </a:rPr>
-              <a:t>…</a:t>
-            </a:r>
-          </a:p>
-          <a:p>
-            <a:pPr marL="0" indent="0">
-              <a:buNone/>
-            </a:pPr>
-            <a:r>
-              <a:rPr lang="en-GB" sz="1900" dirty="0">
-                <a:latin typeface="Courier New" panose="02070309020205020404" pitchFamily="49" charset="0"/>
-                <a:cs typeface="Courier New" panose="02070309020205020404" pitchFamily="49" charset="0"/>
-              </a:rPr>
-              <a:t>…</a:t>
-            </a:r>
-            <a:endParaRPr lang="en-GB" sz="1900" b="0" i="0" dirty="0">
-              <a:effectLst/>
-              <a:latin typeface="Courier New" panose="02070309020205020404" pitchFamily="49" charset="0"/>
-              <a:cs typeface="Courier New" panose="02070309020205020404" pitchFamily="49" charset="0"/>
-            </a:endParaRPr>
-          </a:p>
-          <a:p>
-            <a:pPr marL="0" indent="0">
-              <a:buNone/>
-            </a:pPr>
-            <a:r>
-              <a:rPr lang="en-GB" sz="1900" b="0" i="0" dirty="0" err="1">
-                <a:effectLst/>
-                <a:latin typeface="Courier New" panose="02070309020205020404" pitchFamily="49" charset="0"/>
-                <a:cs typeface="Courier New" panose="02070309020205020404" pitchFamily="49" charset="0"/>
-              </a:rPr>
-              <a:t>self.global_container</a:t>
-            </a:r>
-            <a:r>
-              <a:rPr lang="en-GB" sz="1900" b="0" i="0" dirty="0">
-                <a:effectLst/>
-                <a:latin typeface="Courier New" panose="02070309020205020404" pitchFamily="49" charset="0"/>
-                <a:cs typeface="Courier New" panose="02070309020205020404" pitchFamily="49" charset="0"/>
-              </a:rPr>
-              <a:t>(</a:t>
-            </a:r>
-            <a:r>
-              <a:rPr lang="en-GB" sz="1900" b="0" i="0" dirty="0">
-                <a:solidFill>
-                  <a:srgbClr val="A709F5"/>
-                </a:solidFill>
-                <a:effectLst/>
-                <a:latin typeface="Courier New" panose="02070309020205020404" pitchFamily="49" charset="0"/>
-                <a:cs typeface="Courier New" panose="02070309020205020404" pitchFamily="49" charset="0"/>
-              </a:rPr>
-              <a:t>'reset'</a:t>
-            </a:r>
-            <a:r>
-              <a:rPr lang="en-GB" sz="1900" b="0" i="0" dirty="0">
-                <a:effectLst/>
-                <a:latin typeface="Courier New" panose="02070309020205020404" pitchFamily="49" charset="0"/>
-                <a:cs typeface="Courier New" panose="02070309020205020404" pitchFamily="49" charset="0"/>
-              </a:rPr>
-              <a:t>,self.global_name_,</a:t>
-            </a:r>
-            <a:r>
-              <a:rPr lang="en-GB" sz="1900" b="0" i="0" dirty="0" err="1">
-                <a:effectLst/>
-                <a:latin typeface="Courier New" panose="02070309020205020404" pitchFamily="49" charset="0"/>
-                <a:cs typeface="Courier New" panose="02070309020205020404" pitchFamily="49" charset="0"/>
-              </a:rPr>
-              <a:t>glcont</a:t>
-            </a:r>
-            <a:r>
-              <a:rPr lang="en-GB" sz="1900" b="0" i="0" dirty="0">
-                <a:effectLst/>
-                <a:latin typeface="Courier New" panose="02070309020205020404" pitchFamily="49" charset="0"/>
-                <a:cs typeface="Courier New" panose="02070309020205020404" pitchFamily="49" charset="0"/>
-              </a:rPr>
-              <a:t>);</a:t>
-            </a:r>
-          </a:p>
-          <a:p>
-            <a:endParaRPr lang="en-GB" dirty="0"/>
+              <a:rPr lang="en-GB" sz="2400" dirty="0"/>
+              <a:t>I</a:t>
+            </a:r>
+            <a:r>
+              <a:rPr lang="en-GB" sz="2000" dirty="0"/>
+              <a:t>t is non-standard and Horace-specific. When maintainer looks at the code, he/she would not immediately understand what is there and need to read complex custom description on what is this and how to work with it, while any software graduate student is familiar with a standard singleton.</a:t>
+            </a:r>
           </a:p>
         </p:txBody>
       </p:sp>
       <p:sp>
         <p:nvSpPr>
-          <p:cNvPr id="11" name="Content Placeholder 10">
-            <a:extLst>
-              <a:ext uri="{FF2B5EF4-FFF2-40B4-BE49-F238E27FC236}">
-                <a16:creationId xmlns:a16="http://schemas.microsoft.com/office/drawing/2014/main" id="{F2D48621-C553-D567-F028-D42AF4A8D0B2}"/>
+          <p:cNvPr id="10" name="Rectangle 2">
+            <a:extLst>
+              <a:ext uri="{FF2B5EF4-FFF2-40B4-BE49-F238E27FC236}">
+                <a16:creationId xmlns:a16="http://schemas.microsoft.com/office/drawing/2014/main" id="{A5C968F9-59B1-D0C2-675C-BB32EFBB8213}"/>
               </a:ext>
             </a:extLst>
           </p:cNvPr>
           <p:cNvSpPr>
-            <a:spLocks noGrp="1"/>
+            <a:spLocks noChangeArrowheads="1"/>
           </p:cNvSpPr>
-          <p:nvPr>
-            <p:ph sz="half" idx="2"/>
-          </p:nvPr>
+          <p:nvPr/>
         </p:nvSpPr>
-        <p:spPr>
+        <p:spPr bwMode="auto">
           <a:xfrm>
-            <a:off x="907906" y="4231766"/>
-            <a:ext cx="9937779" cy="2401116"/>
-          </a:xfrm>
-          <a:ln w="25400">
-            <a:solidFill>
-              <a:srgbClr val="00B050"/>
-            </a:solidFill>
+            <a:off x="753911" y="2044914"/>
+            <a:ext cx="10070898" cy="3970318"/>
+          </a:xfrm>
+          <a:prstGeom prst="rect">
+            <a:avLst/>
+          </a:prstGeom>
+          <a:noFill/>
+          <a:ln>
+            <a:noFill/>
           </a:ln>
+          <a:effectLst/>
+          <a:extLst>
+            <a:ext uri="{909E8E84-426E-40DD-AFC4-6F175D3DCCD1}">
+              <a14:hiddenFill xmlns:a14="http://schemas.microsoft.com/office/drawing/2010/main">
+                <a:solidFill>
+                  <a:schemeClr val="accent1"/>
+                </a:solidFill>
+              </a14:hiddenFill>
+            </a:ext>
+            <a:ext uri="{91240B29-F687-4F45-9708-019B960494DF}">
+              <a14:hiddenLine xmlns:a14="http://schemas.microsoft.com/office/drawing/2010/main" w="9525">
+                <a:solidFill>
+                  <a:schemeClr val="tx1"/>
+                </a:solidFill>
+                <a:miter lim="800000"/>
+                <a:headEnd/>
+                <a:tailEnd/>
+              </a14:hiddenLine>
+            </a:ext>
+            <a:ext uri="{AF507438-7753-43E0-B8FC-AC1667EBCBE1}">
+              <a14:hiddenEffects xmlns:a14="http://schemas.microsoft.com/office/drawing/2010/main">
+                <a:effectLst>
+                  <a:outerShdw dist="35921" dir="2700000" algn="ctr" rotWithShape="0">
+                    <a:schemeClr val="bg2"/>
+                  </a:outerShdw>
+                </a:effectLst>
+              </a14:hiddenEffects>
+            </a:ext>
+          </a:extLst>
         </p:spPr>
         <p:txBody>
-          <a:bodyPr>
-            <a:normAutofit/>
+          <a:bodyPr vert="horz" wrap="none" lIns="91440" tIns="45720" rIns="91440" bIns="45720" numCol="1" anchor="ctr" anchorCtr="0" compatLnSpc="1">
+            <a:prstTxWarp prst="textNoShape">
+              <a:avLst/>
+            </a:prstTxWarp>
+            <a:spAutoFit/>
           </a:bodyPr>
           <a:lstStyle/>
           <a:p>
-            <a:pPr marL="0" indent="0">
+            <a:pPr marL="0" marR="0" lvl="0" indent="0" algn="l" defTabSz="914400" rtl="0" eaLnBrk="0" fontAlgn="base" latinLnBrk="0" hangingPunct="0">
+              <a:lnSpc>
+                <a:spcPct val="100000"/>
+              </a:lnSpc>
+              <a:spcBef>
+                <a:spcPct val="0"/>
+              </a:spcBef>
+              <a:spcAft>
+                <a:spcPct val="0"/>
+              </a:spcAft>
+              <a:buClrTx/>
+              <a:buSzTx/>
+              <a:buFontTx/>
               <a:buNone/>
+              <a:tabLst/>
             </a:pPr>
-            <a:r>
-              <a:rPr lang="en-GB" sz="1900" dirty="0">
-                <a:latin typeface="Courier New" panose="02070309020205020404" pitchFamily="49" charset="0"/>
-                <a:cs typeface="Courier New" panose="02070309020205020404" pitchFamily="49" charset="0"/>
-              </a:rPr>
-              <a:t>storage = </a:t>
-            </a:r>
-            <a:r>
-              <a:rPr lang="en-GB" sz="1900" dirty="0" err="1">
-                <a:latin typeface="Courier New" panose="02070309020205020404" pitchFamily="49" charset="0"/>
-                <a:cs typeface="Courier New" panose="02070309020205020404" pitchFamily="49" charset="0"/>
-              </a:rPr>
-              <a:t>unique_obj_store.instance</a:t>
-            </a:r>
-            <a:r>
-              <a:rPr lang="en-GB" sz="1900" dirty="0">
-                <a:latin typeface="Courier New" panose="02070309020205020404" pitchFamily="49" charset="0"/>
-                <a:cs typeface="Courier New" panose="02070309020205020404" pitchFamily="49" charset="0"/>
-              </a:rPr>
-              <a:t>().</a:t>
-            </a:r>
-            <a:r>
-              <a:rPr lang="en-GB" sz="1900" b="1" dirty="0" err="1">
-                <a:latin typeface="Courier New" panose="02070309020205020404" pitchFamily="49" charset="0"/>
-                <a:cs typeface="Courier New" panose="02070309020205020404" pitchFamily="49" charset="0"/>
-              </a:rPr>
-              <a:t>get_objects</a:t>
-            </a:r>
-            <a:r>
-              <a:rPr lang="en-GB" sz="1900" dirty="0">
-                <a:latin typeface="Courier New" panose="02070309020205020404" pitchFamily="49" charset="0"/>
-                <a:cs typeface="Courier New" panose="02070309020205020404" pitchFamily="49" charset="0"/>
-              </a:rPr>
-              <a:t>(</a:t>
-            </a:r>
-            <a:r>
-              <a:rPr lang="en-GB" sz="1900" dirty="0" err="1">
-                <a:latin typeface="Courier New" panose="02070309020205020404" pitchFamily="49" charset="0"/>
-                <a:cs typeface="Courier New" panose="02070309020205020404" pitchFamily="49" charset="0"/>
-              </a:rPr>
-              <a:t>self.basename</a:t>
-            </a:r>
-            <a:r>
-              <a:rPr lang="en-GB" sz="1900" dirty="0">
-                <a:latin typeface="Courier New" panose="02070309020205020404" pitchFamily="49" charset="0"/>
-                <a:cs typeface="Courier New" panose="02070309020205020404" pitchFamily="49" charset="0"/>
-              </a:rPr>
-              <a:t>)</a:t>
-            </a:r>
-          </a:p>
-          <a:p>
-            <a:pPr marL="0" indent="0">
+            <a:br>
+              <a:rPr kumimoji="0" lang="en-US" altLang="en-US" sz="1800" b="0" i="0" u="none" strike="noStrike" cap="none" normalizeH="0" baseline="0" dirty="0">
+                <a:ln>
+                  <a:noFill/>
+                </a:ln>
+                <a:solidFill>
+                  <a:schemeClr val="tx1"/>
+                </a:solidFill>
+                <a:effectLst/>
+                <a:latin typeface="Arial" panose="020B0604020202020204" pitchFamily="34" charset="0"/>
+              </a:rPr>
+            </a:br>
+            <a:r>
+              <a:rPr kumimoji="0" lang="en-US" altLang="en-US" sz="1800" b="0" i="0" u="none" strike="noStrike" cap="none" normalizeH="0" baseline="0" dirty="0">
+                <a:ln>
+                  <a:noFill/>
+                </a:ln>
+                <a:solidFill>
+                  <a:schemeClr val="tx1"/>
+                </a:solidFill>
+                <a:effectLst/>
+                <a:latin typeface="Arial" panose="020B0604020202020204" pitchFamily="34" charset="0"/>
+              </a:rPr>
+              <a:t>Singleton is a standard pattern in software engineering.</a:t>
+            </a:r>
+          </a:p>
+          <a:p>
+            <a:pPr marL="0" marR="0" lvl="0" indent="0" algn="l" defTabSz="914400" rtl="0" eaLnBrk="0" fontAlgn="base" latinLnBrk="0" hangingPunct="0">
+              <a:lnSpc>
+                <a:spcPct val="100000"/>
+              </a:lnSpc>
+              <a:spcBef>
+                <a:spcPct val="0"/>
+              </a:spcBef>
+              <a:spcAft>
+                <a:spcPct val="0"/>
+              </a:spcAft>
+              <a:buClrTx/>
+              <a:buSzTx/>
+              <a:buFontTx/>
               <a:buNone/>
+              <a:tabLst/>
             </a:pPr>
             <a:r>
-              <a:rPr lang="en-GB" sz="1900" dirty="0">
-                <a:latin typeface="Courier New" panose="02070309020205020404" pitchFamily="49" charset="0"/>
-                <a:cs typeface="Courier New" panose="02070309020205020404" pitchFamily="49" charset="0"/>
-              </a:rPr>
-              <a:t>…</a:t>
-            </a:r>
-          </a:p>
-          <a:p>
-            <a:pPr marL="0" indent="0">
+              <a:rPr kumimoji="0" lang="en-US" altLang="en-US" sz="1800" b="0" i="0" u="none" strike="noStrike" cap="none" normalizeH="0" baseline="0" dirty="0">
+                <a:ln>
+                  <a:noFill/>
+                </a:ln>
+                <a:solidFill>
+                  <a:schemeClr val="tx1"/>
+                </a:solidFill>
+                <a:effectLst/>
+                <a:latin typeface="Arial" panose="020B0604020202020204" pitchFamily="34" charset="0"/>
+              </a:rPr>
+              <a:t>Search "Singleton in </a:t>
+            </a:r>
+            <a:r>
+              <a:rPr kumimoji="0" lang="en-US" altLang="en-US" sz="1800" b="0" i="0" u="none" strike="noStrike" cap="none" normalizeH="0" baseline="0" dirty="0" err="1">
+                <a:ln>
+                  <a:noFill/>
+                </a:ln>
+                <a:solidFill>
+                  <a:schemeClr val="tx1"/>
+                </a:solidFill>
+                <a:effectLst/>
+                <a:latin typeface="Arial" panose="020B0604020202020204" pitchFamily="34" charset="0"/>
+              </a:rPr>
+              <a:t>Matlab</a:t>
+            </a:r>
+            <a:r>
+              <a:rPr kumimoji="0" lang="en-US" altLang="en-US" sz="1800" b="0" i="0" u="none" strike="noStrike" cap="none" normalizeH="0" baseline="0" dirty="0">
+                <a:ln>
+                  <a:noFill/>
+                </a:ln>
+                <a:solidFill>
+                  <a:schemeClr val="tx1"/>
+                </a:solidFill>
+                <a:effectLst/>
+                <a:latin typeface="Arial" panose="020B0604020202020204" pitchFamily="34" charset="0"/>
+              </a:rPr>
+              <a:t>" returns bunch of references, e.g.:</a:t>
+            </a:r>
+          </a:p>
+          <a:p>
+            <a:pPr marL="0" marR="0" lvl="0" indent="0" algn="l" defTabSz="914400" rtl="0" eaLnBrk="0" fontAlgn="base" latinLnBrk="0" hangingPunct="0">
+              <a:lnSpc>
+                <a:spcPct val="100000"/>
+              </a:lnSpc>
+              <a:spcBef>
+                <a:spcPct val="0"/>
+              </a:spcBef>
+              <a:spcAft>
+                <a:spcPct val="0"/>
+              </a:spcAft>
+              <a:buClrTx/>
+              <a:buSzTx/>
+              <a:buFontTx/>
+              <a:buChar char="•"/>
+              <a:tabLst/>
+            </a:pPr>
+            <a:r>
+              <a:rPr kumimoji="0" lang="en-US" altLang="en-US" sz="1800" b="0" i="0" u="none" strike="noStrike" cap="none" normalizeH="0" baseline="0" dirty="0">
+                <a:ln>
+                  <a:noFill/>
+                </a:ln>
+                <a:solidFill>
+                  <a:schemeClr val="tx1"/>
+                </a:solidFill>
+                <a:effectLst/>
+                <a:latin typeface="Arial" panose="020B0604020202020204" pitchFamily="34" charset="0"/>
+                <a:hlinkClick r:id="rId2"/>
+              </a:rPr>
+              <a:t>https://uk.mathworks.com/matlabcentral/fileexchange/24911-design-pattern-singleton-creational</a:t>
+            </a:r>
+            <a:r>
+              <a:rPr kumimoji="0" lang="en-US" altLang="en-US" sz="1800" b="0" i="0" u="none" strike="noStrike" cap="none" normalizeH="0" baseline="0" dirty="0">
+                <a:ln>
+                  <a:noFill/>
+                </a:ln>
+                <a:solidFill>
+                  <a:schemeClr val="tx1"/>
+                </a:solidFill>
+                <a:effectLst/>
+                <a:latin typeface="Arial" panose="020B0604020202020204" pitchFamily="34" charset="0"/>
+              </a:rPr>
+              <a:t> </a:t>
+            </a:r>
+          </a:p>
+          <a:p>
+            <a:pPr marL="0" marR="0" lvl="0" indent="0" algn="l" defTabSz="914400" rtl="0" eaLnBrk="0" fontAlgn="base" latinLnBrk="0" hangingPunct="0">
+              <a:lnSpc>
+                <a:spcPct val="100000"/>
+              </a:lnSpc>
+              <a:spcBef>
+                <a:spcPct val="0"/>
+              </a:spcBef>
+              <a:spcAft>
+                <a:spcPct val="0"/>
+              </a:spcAft>
+              <a:buClrTx/>
+              <a:buSzTx/>
+              <a:buFontTx/>
+              <a:buChar char="•"/>
+              <a:tabLst/>
+            </a:pPr>
+            <a:r>
+              <a:rPr kumimoji="0" lang="en-US" altLang="en-US" sz="1800" b="0" i="0" u="none" strike="noStrike" cap="none" normalizeH="0" baseline="0" dirty="0">
+                <a:ln>
+                  <a:noFill/>
+                </a:ln>
+                <a:solidFill>
+                  <a:schemeClr val="tx1"/>
+                </a:solidFill>
+                <a:effectLst/>
+                <a:latin typeface="Arial" panose="020B0604020202020204" pitchFamily="34" charset="0"/>
+                <a:hlinkClick r:id="rId3"/>
+              </a:rPr>
+              <a:t>https://medium.com/@bishikh90/design-patterns-in-matlab-part-1-b0dac5dc9eb7</a:t>
+            </a:r>
+            <a:r>
+              <a:rPr kumimoji="0" lang="en-US" altLang="en-US" sz="1800" b="0" i="0" u="none" strike="noStrike" cap="none" normalizeH="0" baseline="0" dirty="0">
+                <a:ln>
+                  <a:noFill/>
+                </a:ln>
+                <a:solidFill>
+                  <a:schemeClr val="tx1"/>
+                </a:solidFill>
+                <a:effectLst/>
+                <a:latin typeface="Arial" panose="020B0604020202020204" pitchFamily="34" charset="0"/>
+              </a:rPr>
+              <a:t> </a:t>
+            </a:r>
+          </a:p>
+          <a:p>
+            <a:pPr marL="0" marR="0" lvl="0" indent="0" algn="l" defTabSz="914400" rtl="0" eaLnBrk="0" fontAlgn="base" latinLnBrk="0" hangingPunct="0">
+              <a:lnSpc>
+                <a:spcPct val="100000"/>
+              </a:lnSpc>
+              <a:spcBef>
+                <a:spcPct val="0"/>
+              </a:spcBef>
+              <a:spcAft>
+                <a:spcPct val="0"/>
+              </a:spcAft>
+              <a:buClrTx/>
+              <a:buSzTx/>
+              <a:buFontTx/>
+              <a:buChar char="•"/>
+              <a:tabLst/>
+            </a:pPr>
+            <a:r>
+              <a:rPr kumimoji="0" lang="en-US" altLang="en-US" sz="1800" b="0" i="0" u="none" strike="noStrike" cap="none" normalizeH="0" baseline="0" dirty="0">
+                <a:ln>
+                  <a:noFill/>
+                </a:ln>
+                <a:solidFill>
+                  <a:schemeClr val="tx1"/>
+                </a:solidFill>
+                <a:effectLst/>
+                <a:latin typeface="Arial" panose="020B0604020202020204" pitchFamily="34" charset="0"/>
+                <a:hlinkClick r:id="rId4"/>
+              </a:rPr>
+              <a:t>https://www.geeksforgeeks.org/singleton-design-pattern/</a:t>
+            </a:r>
+            <a:r>
+              <a:rPr kumimoji="0" lang="en-US" altLang="en-US" sz="1800" b="0" i="0" u="none" strike="noStrike" cap="none" normalizeH="0" baseline="0" dirty="0">
+                <a:ln>
+                  <a:noFill/>
+                </a:ln>
+                <a:solidFill>
+                  <a:schemeClr val="tx1"/>
+                </a:solidFill>
+                <a:effectLst/>
+                <a:latin typeface="Arial" panose="020B0604020202020204" pitchFamily="34" charset="0"/>
+              </a:rPr>
+              <a:t> </a:t>
+            </a:r>
+          </a:p>
+          <a:p>
+            <a:pPr marL="0" marR="0" lvl="0" indent="0" algn="l" defTabSz="914400" rtl="0" eaLnBrk="0" fontAlgn="base" latinLnBrk="0" hangingPunct="0">
+              <a:lnSpc>
+                <a:spcPct val="100000"/>
+              </a:lnSpc>
+              <a:spcBef>
+                <a:spcPct val="0"/>
+              </a:spcBef>
+              <a:spcAft>
+                <a:spcPct val="0"/>
+              </a:spcAft>
+              <a:buClrTx/>
+              <a:buSzTx/>
+              <a:buFontTx/>
               <a:buNone/>
+              <a:tabLst/>
             </a:pPr>
             <a:r>
-              <a:rPr lang="en-GB" sz="1900" dirty="0">
-                <a:latin typeface="Courier New" panose="02070309020205020404" pitchFamily="49" charset="0"/>
-                <a:cs typeface="Courier New" panose="02070309020205020404" pitchFamily="49" charset="0"/>
-              </a:rPr>
-              <a:t>…</a:t>
-            </a:r>
-          </a:p>
-          <a:p>
-            <a:pPr marL="0" indent="0">
+              <a:rPr kumimoji="0" lang="en-US" altLang="en-US" sz="1800" b="0" i="0" u="none" strike="noStrike" cap="none" normalizeH="0" baseline="0" dirty="0">
+                <a:ln>
+                  <a:noFill/>
+                </a:ln>
+                <a:solidFill>
+                  <a:schemeClr val="tx1"/>
+                </a:solidFill>
+                <a:effectLst/>
+                <a:latin typeface="Arial" panose="020B0604020202020204" pitchFamily="34" charset="0"/>
+              </a:rPr>
+              <a:t>etc.</a:t>
+            </a:r>
+            <a:br>
+              <a:rPr kumimoji="0" lang="en-US" altLang="en-US" sz="1800" b="0" i="0" u="none" strike="noStrike" cap="none" normalizeH="0" baseline="0" dirty="0">
+                <a:ln>
+                  <a:noFill/>
+                </a:ln>
+                <a:solidFill>
+                  <a:schemeClr val="tx1"/>
+                </a:solidFill>
+                <a:effectLst/>
+                <a:latin typeface="Arial" panose="020B0604020202020204" pitchFamily="34" charset="0"/>
+              </a:rPr>
+            </a:br>
+            <a:r>
+              <a:rPr kumimoji="0" lang="en-US" altLang="en-US" sz="1800" b="0" i="0" u="none" strike="noStrike" cap="none" normalizeH="0" baseline="0" dirty="0">
+                <a:ln>
+                  <a:noFill/>
+                </a:ln>
+                <a:solidFill>
+                  <a:schemeClr val="tx1"/>
+                </a:solidFill>
+                <a:effectLst/>
+                <a:latin typeface="Arial" panose="020B0604020202020204" pitchFamily="34" charset="0"/>
+              </a:rPr>
+              <a:t>They are all refer to a bit different implementations which have the same main features:</a:t>
+            </a:r>
+          </a:p>
+          <a:p>
+            <a:pPr marL="0" marR="0" lvl="0" indent="0" algn="l" defTabSz="914400" rtl="0" eaLnBrk="0" fontAlgn="base" latinLnBrk="0" hangingPunct="0">
+              <a:lnSpc>
+                <a:spcPct val="100000"/>
+              </a:lnSpc>
+              <a:spcBef>
+                <a:spcPct val="0"/>
+              </a:spcBef>
+              <a:spcAft>
+                <a:spcPct val="0"/>
+              </a:spcAft>
+              <a:buClrTx/>
+              <a:buSzTx/>
+              <a:buFontTx/>
               <a:buNone/>
+              <a:tabLst/>
             </a:pPr>
-            <a:r>
-              <a:rPr lang="en-GB" sz="1900" dirty="0">
-                <a:latin typeface="Courier New" panose="02070309020205020404" pitchFamily="49" charset="0"/>
-                <a:cs typeface="Courier New" panose="02070309020205020404" pitchFamily="49" charset="0"/>
-              </a:rPr>
-              <a:t>…</a:t>
-            </a:r>
-          </a:p>
-          <a:p>
-            <a:pPr marL="0" indent="0">
-              <a:buNone/>
+            <a:endParaRPr kumimoji="0" lang="en-US" altLang="en-US" sz="1800" b="0" i="0" u="none" strike="noStrike" cap="none" normalizeH="0" baseline="0" dirty="0">
+              <a:ln>
+                <a:noFill/>
+              </a:ln>
+              <a:solidFill>
+                <a:schemeClr val="tx1"/>
+              </a:solidFill>
+              <a:effectLst/>
+              <a:latin typeface="Arial" panose="020B0604020202020204" pitchFamily="34" charset="0"/>
+            </a:endParaRPr>
+          </a:p>
+          <a:p>
+            <a:pPr marL="0" marR="0" lvl="0" indent="0" algn="l" defTabSz="914400" rtl="0" eaLnBrk="0" fontAlgn="base" latinLnBrk="0" hangingPunct="0">
+              <a:lnSpc>
+                <a:spcPct val="100000"/>
+              </a:lnSpc>
+              <a:spcBef>
+                <a:spcPct val="0"/>
+              </a:spcBef>
+              <a:spcAft>
+                <a:spcPct val="0"/>
+              </a:spcAft>
+              <a:buClrTx/>
+              <a:buSzTx/>
+              <a:buFontTx/>
+              <a:buChar char="•"/>
+              <a:tabLst/>
             </a:pPr>
             <a:r>
-              <a:rPr lang="en-GB" sz="1900" dirty="0" err="1">
-                <a:latin typeface="Courier New" panose="02070309020205020404" pitchFamily="49" charset="0"/>
-                <a:cs typeface="Courier New" panose="02070309020205020404" pitchFamily="49" charset="0"/>
-              </a:rPr>
-              <a:t>unique_obj_store.instance</a:t>
-            </a:r>
-            <a:r>
-              <a:rPr lang="en-GB" sz="1900" dirty="0">
-                <a:latin typeface="Courier New" panose="02070309020205020404" pitchFamily="49" charset="0"/>
-                <a:cs typeface="Courier New" panose="02070309020205020404" pitchFamily="49" charset="0"/>
-              </a:rPr>
-              <a:t>().</a:t>
-            </a:r>
-            <a:r>
-              <a:rPr lang="en-GB" sz="1900" b="1" dirty="0" err="1">
-                <a:latin typeface="Courier New" panose="02070309020205020404" pitchFamily="49" charset="0"/>
-                <a:cs typeface="Courier New" panose="02070309020205020404" pitchFamily="49" charset="0"/>
-              </a:rPr>
-              <a:t>set_objects</a:t>
-            </a:r>
-            <a:r>
-              <a:rPr lang="en-GB" sz="1900" dirty="0">
-                <a:latin typeface="Courier New" panose="02070309020205020404" pitchFamily="49" charset="0"/>
-                <a:cs typeface="Courier New" panose="02070309020205020404" pitchFamily="49" charset="0"/>
-              </a:rPr>
-              <a:t>(storage);</a:t>
-            </a:r>
-          </a:p>
-        </p:txBody>
-      </p:sp>
-      <p:sp>
-        <p:nvSpPr>
-          <p:cNvPr id="3" name="Rectangle 2">
-            <a:extLst>
-              <a:ext uri="{FF2B5EF4-FFF2-40B4-BE49-F238E27FC236}">
-                <a16:creationId xmlns:a16="http://schemas.microsoft.com/office/drawing/2014/main" id="{75ECFA10-50C7-5958-43CF-2021984F0DF9}"/>
-              </a:ext>
-            </a:extLst>
-          </p:cNvPr>
-          <p:cNvSpPr/>
-          <p:nvPr/>
-        </p:nvSpPr>
-        <p:spPr>
-          <a:xfrm>
-            <a:off x="7463736" y="2203967"/>
-            <a:ext cx="4344560" cy="812284"/>
-          </a:xfrm>
-          <a:prstGeom prst="rect">
-            <a:avLst/>
-          </a:prstGeom>
-          <a:solidFill>
-            <a:schemeClr val="bg1"/>
-          </a:solidFill>
-          <a:ln>
-            <a:solidFill>
-              <a:srgbClr val="0070C0"/>
-            </a:solidFill>
-          </a:ln>
-        </p:spPr>
-        <p:style>
-          <a:lnRef idx="2">
-            <a:schemeClr val="accent1">
-              <a:shade val="15000"/>
-            </a:schemeClr>
-          </a:lnRef>
-          <a:fillRef idx="1">
-            <a:schemeClr val="accent1"/>
-          </a:fillRef>
-          <a:effectRef idx="0">
-            <a:schemeClr val="accent1"/>
-          </a:effectRef>
-          <a:fontRef idx="minor">
-            <a:schemeClr val="lt1"/>
-          </a:fontRef>
-        </p:style>
-        <p:txBody>
-          <a:bodyPr rtlCol="0" anchor="ctr"/>
-          <a:lstStyle/>
-          <a:p>
-            <a:r>
-              <a:rPr lang="en-GB" dirty="0">
-                <a:solidFill>
-                  <a:schemeClr val="tx1"/>
-                </a:solidFill>
-              </a:rPr>
-              <a:t>Fields of the structure within static function in: </a:t>
-            </a:r>
-            <a:r>
-              <a:rPr lang="en-GB" dirty="0" err="1">
+              <a:rPr kumimoji="0" lang="en-US" altLang="en-US" b="0" i="0" u="none" strike="noStrike" cap="none" normalizeH="0" baseline="0" dirty="0">
+                <a:ln>
+                  <a:noFill/>
+                </a:ln>
                 <a:solidFill>
                   <a:schemeClr val="accent6">
                     <a:lumMod val="75000"/>
                   </a:schemeClr>
                 </a:solidFill>
+                <a:effectLst/>
                 <a:latin typeface="Courier New" panose="02070309020205020404" pitchFamily="49" charset="0"/>
                 <a:cs typeface="Courier New" panose="02070309020205020404" pitchFamily="49" charset="0"/>
               </a:rPr>
-              <a:t>unique_references_container</a:t>
-            </a:r>
-            <a:endParaRPr lang="en-GB" dirty="0">
-              <a:solidFill>
-                <a:schemeClr val="accent6">
-                  <a:lumMod val="75000"/>
-                </a:schemeClr>
-              </a:solidFill>
-              <a:latin typeface="Courier New" panose="02070309020205020404" pitchFamily="49" charset="0"/>
-              <a:cs typeface="Courier New" panose="02070309020205020404" pitchFamily="49" charset="0"/>
-            </a:endParaRPr>
-          </a:p>
-        </p:txBody>
-      </p:sp>
-      <p:cxnSp>
-        <p:nvCxnSpPr>
-          <p:cNvPr id="6" name="Connector: Elbow 5">
-            <a:extLst>
-              <a:ext uri="{FF2B5EF4-FFF2-40B4-BE49-F238E27FC236}">
-                <a16:creationId xmlns:a16="http://schemas.microsoft.com/office/drawing/2014/main" id="{FCB491E9-A27C-BD42-EDD9-874C8DD6AB09}"/>
-              </a:ext>
-            </a:extLst>
-          </p:cNvPr>
-          <p:cNvCxnSpPr>
-            <a:cxnSpLocks/>
-            <a:stCxn id="3" idx="1"/>
-          </p:cNvCxnSpPr>
-          <p:nvPr/>
-        </p:nvCxnSpPr>
-        <p:spPr>
-          <a:xfrm rot="10800000">
-            <a:off x="5959852" y="2055355"/>
-            <a:ext cx="1503884" cy="554754"/>
-          </a:xfrm>
-          <a:prstGeom prst="bentConnector3">
-            <a:avLst>
-              <a:gd name="adj1" fmla="val 100000"/>
-            </a:avLst>
-          </a:prstGeom>
-          <a:ln>
-            <a:tailEnd type="triangle"/>
-          </a:ln>
-        </p:spPr>
-        <p:style>
-          <a:lnRef idx="2">
-            <a:schemeClr val="accent1"/>
-          </a:lnRef>
-          <a:fillRef idx="0">
-            <a:schemeClr val="accent1"/>
-          </a:fillRef>
-          <a:effectRef idx="1">
-            <a:schemeClr val="accent1"/>
-          </a:effectRef>
-          <a:fontRef idx="minor">
-            <a:schemeClr val="tx1"/>
-          </a:fontRef>
-        </p:style>
-      </p:cxnSp>
-      <p:cxnSp>
-        <p:nvCxnSpPr>
-          <p:cNvPr id="12" name="Connector: Elbow 11">
-            <a:extLst>
-              <a:ext uri="{FF2B5EF4-FFF2-40B4-BE49-F238E27FC236}">
-                <a16:creationId xmlns:a16="http://schemas.microsoft.com/office/drawing/2014/main" id="{03168BEE-FE76-55C5-0FFC-254EF91A8AA1}"/>
-              </a:ext>
-            </a:extLst>
-          </p:cNvPr>
-          <p:cNvCxnSpPr>
-            <a:cxnSpLocks/>
-          </p:cNvCxnSpPr>
-          <p:nvPr/>
-        </p:nvCxnSpPr>
-        <p:spPr>
-          <a:xfrm rot="10800000" flipV="1">
-            <a:off x="4572000" y="2610108"/>
-            <a:ext cx="2891736" cy="613065"/>
-          </a:xfrm>
-          <a:prstGeom prst="bentConnector3">
-            <a:avLst>
-              <a:gd name="adj1" fmla="val 100080"/>
-            </a:avLst>
-          </a:prstGeom>
-          <a:ln>
-            <a:tailEnd type="triangle"/>
-          </a:ln>
-        </p:spPr>
-        <p:style>
-          <a:lnRef idx="2">
-            <a:schemeClr val="accent1"/>
-          </a:lnRef>
-          <a:fillRef idx="0">
-            <a:schemeClr val="accent1"/>
-          </a:fillRef>
-          <a:effectRef idx="1">
-            <a:schemeClr val="accent1"/>
-          </a:effectRef>
-          <a:fontRef idx="minor">
-            <a:schemeClr val="tx1"/>
-          </a:fontRef>
-        </p:style>
-      </p:cxnSp>
-      <p:sp>
-        <p:nvSpPr>
-          <p:cNvPr id="21" name="Rectangle 20">
-            <a:extLst>
-              <a:ext uri="{FF2B5EF4-FFF2-40B4-BE49-F238E27FC236}">
-                <a16:creationId xmlns:a16="http://schemas.microsoft.com/office/drawing/2014/main" id="{0F2144C7-FFBA-B1AB-E67D-9DC98DB6B118}"/>
-              </a:ext>
-            </a:extLst>
-          </p:cNvPr>
-          <p:cNvSpPr/>
-          <p:nvPr/>
-        </p:nvSpPr>
-        <p:spPr>
-          <a:xfrm>
-            <a:off x="7889991" y="4786522"/>
-            <a:ext cx="3987926" cy="812284"/>
-          </a:xfrm>
-          <a:prstGeom prst="rect">
-            <a:avLst/>
-          </a:prstGeom>
-          <a:solidFill>
-            <a:schemeClr val="bg1"/>
-          </a:solidFill>
-          <a:ln>
-            <a:solidFill>
-              <a:srgbClr val="0070C0"/>
-            </a:solidFill>
-          </a:ln>
-        </p:spPr>
-        <p:style>
-          <a:lnRef idx="2">
-            <a:schemeClr val="accent1">
-              <a:shade val="15000"/>
-            </a:schemeClr>
-          </a:lnRef>
-          <a:fillRef idx="1">
-            <a:schemeClr val="accent1"/>
-          </a:fillRef>
-          <a:effectRef idx="0">
-            <a:schemeClr val="accent1"/>
-          </a:effectRef>
-          <a:fontRef idx="minor">
-            <a:schemeClr val="lt1"/>
-          </a:fontRef>
-        </p:style>
-        <p:txBody>
-          <a:bodyPr rtlCol="0" anchor="ctr"/>
-          <a:lstStyle/>
-          <a:p>
-            <a:r>
-              <a:rPr lang="en-GB" dirty="0">
-                <a:solidFill>
-                  <a:schemeClr val="tx1"/>
-                </a:solidFill>
-              </a:rPr>
-              <a:t>Methods of standard singleton class:</a:t>
-            </a:r>
-          </a:p>
-          <a:p>
-            <a:r>
-              <a:rPr lang="en-GB" dirty="0" err="1">
+              <a:t>static protected storage </a:t>
+            </a:r>
+          </a:p>
+          <a:p>
+            <a:pPr marL="0" marR="0" lvl="0" indent="0" algn="l" defTabSz="914400" rtl="0" eaLnBrk="0" fontAlgn="base" latinLnBrk="0" hangingPunct="0">
+              <a:lnSpc>
+                <a:spcPct val="100000"/>
+              </a:lnSpc>
+              <a:spcBef>
+                <a:spcPct val="0"/>
+              </a:spcBef>
+              <a:spcAft>
+                <a:spcPct val="0"/>
+              </a:spcAft>
+              <a:buClrTx/>
+              <a:buSzTx/>
+              <a:buFontTx/>
+              <a:buChar char="•"/>
+              <a:tabLst/>
+            </a:pPr>
+            <a:r>
+              <a:rPr kumimoji="0" lang="en-US" altLang="en-US" sz="1800" b="0" i="0" u="none" strike="noStrike" cap="none" normalizeH="0" baseline="0" dirty="0">
+                <a:ln>
+                  <a:noFill/>
+                </a:ln>
                 <a:solidFill>
                   <a:schemeClr val="accent6">
                     <a:lumMod val="75000"/>
                   </a:schemeClr>
                 </a:solidFill>
+                <a:effectLst/>
                 <a:latin typeface="Courier New" panose="02070309020205020404" pitchFamily="49" charset="0"/>
                 <a:cs typeface="Courier New" panose="02070309020205020404" pitchFamily="49" charset="0"/>
               </a:rPr>
-              <a:t>unique_obj_store</a:t>
-            </a:r>
-            <a:endParaRPr lang="en-GB" dirty="0">
+              <a:t>private constructor </a:t>
+            </a:r>
+          </a:p>
+          <a:p>
+            <a:pPr marL="0" marR="0" lvl="0" indent="0" algn="l" defTabSz="914400" rtl="0" eaLnBrk="0" fontAlgn="base" latinLnBrk="0" hangingPunct="0">
+              <a:lnSpc>
+                <a:spcPct val="100000"/>
+              </a:lnSpc>
+              <a:spcBef>
+                <a:spcPct val="0"/>
+              </a:spcBef>
+              <a:spcAft>
+                <a:spcPct val="0"/>
+              </a:spcAft>
+              <a:buClrTx/>
+              <a:buSzTx/>
+              <a:buFontTx/>
+              <a:buChar char="•"/>
+              <a:tabLst/>
+            </a:pPr>
+            <a:r>
+              <a:rPr kumimoji="0" lang="en-US" altLang="en-US" sz="1800" b="0" i="0" u="none" strike="noStrike" cap="none" normalizeH="0" baseline="0" dirty="0">
+                <a:ln>
+                  <a:noFill/>
+                </a:ln>
+                <a:solidFill>
+                  <a:schemeClr val="accent6">
+                    <a:lumMod val="75000"/>
+                  </a:schemeClr>
+                </a:solidFill>
+                <a:effectLst/>
+                <a:latin typeface="Courier New" panose="02070309020205020404" pitchFamily="49" charset="0"/>
+                <a:cs typeface="Courier New" panose="02070309020205020404" pitchFamily="49" charset="0"/>
+              </a:rPr>
+              <a:t>static </a:t>
+            </a:r>
+            <a:r>
+              <a:rPr kumimoji="0" lang="en-US" altLang="en-US" b="0" i="0" u="none" strike="noStrike" cap="none" normalizeH="0" baseline="0" dirty="0">
+                <a:ln>
+                  <a:noFill/>
+                </a:ln>
+                <a:solidFill>
+                  <a:schemeClr val="accent6">
+                    <a:lumMod val="75000"/>
+                  </a:schemeClr>
+                </a:solidFill>
+                <a:effectLst/>
+                <a:latin typeface="Courier New" panose="02070309020205020404" pitchFamily="49" charset="0"/>
+                <a:cs typeface="Courier New" panose="02070309020205020404" pitchFamily="49" charset="0"/>
+              </a:rPr>
+              <a:t>instance method which provides access to internal storage </a:t>
+            </a:r>
+          </a:p>
+          <a:p>
+            <a:pPr marL="0" marR="0" lvl="0" indent="0" algn="l" defTabSz="914400" rtl="0" eaLnBrk="0" fontAlgn="base" latinLnBrk="0" hangingPunct="0">
+              <a:lnSpc>
+                <a:spcPct val="100000"/>
+              </a:lnSpc>
+              <a:spcBef>
+                <a:spcPct val="0"/>
+              </a:spcBef>
+              <a:spcAft>
+                <a:spcPct val="0"/>
+              </a:spcAft>
+              <a:buClrTx/>
+              <a:buSzTx/>
+              <a:tabLst/>
+            </a:pPr>
+            <a:r>
+              <a:rPr kumimoji="0" lang="en-US" altLang="en-US" b="0" i="0" u="none" strike="noStrike" cap="none" normalizeH="0" baseline="0" dirty="0">
+                <a:ln>
+                  <a:noFill/>
+                </a:ln>
+                <a:solidFill>
+                  <a:schemeClr val="accent6">
+                    <a:lumMod val="75000"/>
+                  </a:schemeClr>
+                </a:solidFill>
+                <a:effectLst/>
+                <a:latin typeface="Courier New" panose="02070309020205020404" pitchFamily="49" charset="0"/>
+                <a:cs typeface="Courier New" panose="02070309020205020404" pitchFamily="49" charset="0"/>
+              </a:rPr>
+              <a:t>and methods which interact with this storage.</a:t>
+            </a:r>
+            <a:r>
+              <a:rPr kumimoji="0" lang="en-US" altLang="en-US" b="0" i="0" u="none" strike="noStrike" cap="none" normalizeH="0" baseline="0" dirty="0">
+                <a:ln>
+                  <a:noFill/>
+                </a:ln>
+                <a:solidFill>
+                  <a:schemeClr val="accent6">
+                    <a:lumMod val="75000"/>
+                  </a:schemeClr>
+                </a:solidFill>
+                <a:effectLst/>
+                <a:latin typeface="+mj-lt"/>
+              </a:rPr>
+              <a:t> </a:t>
+            </a:r>
+          </a:p>
+          <a:p>
+            <a:pPr marL="0" marR="0" lvl="0" indent="0" algn="l" defTabSz="914400" rtl="0" eaLnBrk="0" fontAlgn="base" latinLnBrk="0" hangingPunct="0">
+              <a:lnSpc>
+                <a:spcPct val="100000"/>
+              </a:lnSpc>
+              <a:spcBef>
+                <a:spcPct val="0"/>
+              </a:spcBef>
+              <a:spcAft>
+                <a:spcPct val="0"/>
+              </a:spcAft>
+              <a:buClrTx/>
+              <a:buSzTx/>
+              <a:buFontTx/>
+              <a:buNone/>
+              <a:tabLst/>
+            </a:pPr>
+            <a:endParaRPr kumimoji="0" lang="en-US" altLang="en-US" sz="1800" b="0" i="0" u="none" strike="noStrike" cap="none" normalizeH="0" baseline="0" dirty="0">
+              <a:ln>
+                <a:noFill/>
+              </a:ln>
               <a:solidFill>
-                <a:schemeClr val="accent6">
-                  <a:lumMod val="75000"/>
-                </a:schemeClr>
+                <a:schemeClr val="tx1"/>
               </a:solidFill>
-              <a:latin typeface="Courier New" panose="02070309020205020404" pitchFamily="49" charset="0"/>
-              <a:cs typeface="Courier New" panose="02070309020205020404" pitchFamily="49" charset="0"/>
+              <a:effectLst/>
+              <a:latin typeface="Arial" panose="020B0604020202020204" pitchFamily="34" charset="0"/>
             </a:endParaRPr>
           </a:p>
         </p:txBody>
       </p:sp>
-      <p:cxnSp>
-        <p:nvCxnSpPr>
-          <p:cNvPr id="22" name="Connector: Elbow 21">
-            <a:extLst>
-              <a:ext uri="{FF2B5EF4-FFF2-40B4-BE49-F238E27FC236}">
-                <a16:creationId xmlns:a16="http://schemas.microsoft.com/office/drawing/2014/main" id="{A489B00F-1697-8088-825B-FCE8BC7356F1}"/>
-              </a:ext>
-            </a:extLst>
-          </p:cNvPr>
-          <p:cNvCxnSpPr>
-            <a:cxnSpLocks/>
-          </p:cNvCxnSpPr>
-          <p:nvPr/>
-        </p:nvCxnSpPr>
-        <p:spPr>
-          <a:xfrm rot="10800000">
-            <a:off x="6665373" y="4609133"/>
-            <a:ext cx="1224618" cy="607484"/>
-          </a:xfrm>
-          <a:prstGeom prst="bentConnector3">
-            <a:avLst>
-              <a:gd name="adj1" fmla="val 100410"/>
-            </a:avLst>
-          </a:prstGeom>
-          <a:ln>
-            <a:tailEnd type="triangle"/>
-          </a:ln>
-        </p:spPr>
-        <p:style>
-          <a:lnRef idx="2">
-            <a:schemeClr val="accent1"/>
-          </a:lnRef>
-          <a:fillRef idx="0">
-            <a:schemeClr val="accent1"/>
-          </a:fillRef>
-          <a:effectRef idx="1">
-            <a:schemeClr val="accent1"/>
-          </a:effectRef>
-          <a:fontRef idx="minor">
-            <a:schemeClr val="tx1"/>
-          </a:fontRef>
-        </p:style>
-      </p:cxnSp>
-      <p:cxnSp>
-        <p:nvCxnSpPr>
-          <p:cNvPr id="27" name="Connector: Elbow 26">
-            <a:extLst>
-              <a:ext uri="{FF2B5EF4-FFF2-40B4-BE49-F238E27FC236}">
-                <a16:creationId xmlns:a16="http://schemas.microsoft.com/office/drawing/2014/main" id="{57FDBDB3-49CD-403E-EBD3-8BEA2D4CF3C7}"/>
-              </a:ext>
-            </a:extLst>
-          </p:cNvPr>
-          <p:cNvCxnSpPr>
-            <a:cxnSpLocks/>
-          </p:cNvCxnSpPr>
-          <p:nvPr/>
-        </p:nvCxnSpPr>
-        <p:spPr>
-          <a:xfrm rot="10800000" flipV="1">
-            <a:off x="5245037" y="5216619"/>
-            <a:ext cx="2644955" cy="625654"/>
-          </a:xfrm>
-          <a:prstGeom prst="bentConnector3">
-            <a:avLst>
-              <a:gd name="adj1" fmla="val 100541"/>
-            </a:avLst>
-          </a:prstGeom>
-          <a:ln>
-            <a:tailEnd type="triangle"/>
-          </a:ln>
-        </p:spPr>
-        <p:style>
-          <a:lnRef idx="2">
-            <a:schemeClr val="accent1"/>
-          </a:lnRef>
-          <a:fillRef idx="0">
-            <a:schemeClr val="accent1"/>
-          </a:fillRef>
-          <a:effectRef idx="1">
-            <a:schemeClr val="accent1"/>
-          </a:effectRef>
-          <a:fontRef idx="minor">
-            <a:schemeClr val="tx1"/>
-          </a:fontRef>
-        </p:style>
-      </p:cxnSp>
     </p:spTree>
     <p:extLst>
       <p:ext uri="{BB962C8B-B14F-4D97-AF65-F5344CB8AC3E}">
-        <p14:creationId xmlns:p14="http://schemas.microsoft.com/office/powerpoint/2010/main" val="34684478"/>
+        <p14:creationId xmlns:p14="http://schemas.microsoft.com/office/powerpoint/2010/main" val="1117945640"/>
       </p:ext>
     </p:extLst>
   </p:cSld>
@@ -15983,6 +15900,829 @@
   <p:cSld>
     <p:spTree>
       <p:nvGrpSpPr>
+        <p:cNvPr id="1" name="">
+          <a:extLst>
+            <a:ext uri="{FF2B5EF4-FFF2-40B4-BE49-F238E27FC236}">
+              <a16:creationId xmlns:a16="http://schemas.microsoft.com/office/drawing/2014/main" id="{259DA183-24F6-6400-C510-5E43E0F65E4E}"/>
+            </a:ext>
+          </a:extLst>
+        </p:cNvPr>
+        <p:cNvGrpSpPr/>
+        <p:nvPr/>
+      </p:nvGrpSpPr>
+      <p:grpSpPr>
+        <a:xfrm>
+          <a:off x="0" y="0"/>
+          <a:ext cx="0" cy="0"/>
+          <a:chOff x="0" y="0"/>
+          <a:chExt cx="0" cy="0"/>
+        </a:xfrm>
+      </p:grpSpPr>
+      <p:sp>
+        <p:nvSpPr>
+          <p:cNvPr id="2" name="Title 1">
+            <a:extLst>
+              <a:ext uri="{FF2B5EF4-FFF2-40B4-BE49-F238E27FC236}">
+                <a16:creationId xmlns:a16="http://schemas.microsoft.com/office/drawing/2014/main" id="{D624607A-D87C-4FEB-75EB-39CCE5542C9E}"/>
+              </a:ext>
+            </a:extLst>
+          </p:cNvPr>
+          <p:cNvSpPr>
+            <a:spLocks noGrp="1"/>
+          </p:cNvSpPr>
+          <p:nvPr>
+            <p:ph type="title"/>
+          </p:nvPr>
+        </p:nvSpPr>
+        <p:spPr/>
+        <p:txBody>
+          <a:bodyPr>
+            <a:normAutofit/>
+          </a:bodyPr>
+          <a:lstStyle/>
+          <a:p>
+            <a:r>
+              <a:rPr lang="en-GB" sz="3600" dirty="0">
+                <a:solidFill>
+                  <a:schemeClr val="tx1"/>
+                </a:solidFill>
+              </a:rPr>
+              <a:t>Problem with unique references singleton </a:t>
+            </a:r>
+            <a:r>
+              <a:rPr lang="en-GB" sz="3600" dirty="0">
+                <a:solidFill>
+                  <a:srgbClr val="7030A0"/>
+                </a:solidFill>
+              </a:rPr>
+              <a:t>#1791 </a:t>
+            </a:r>
+            <a:br>
+              <a:rPr lang="en-GB" sz="3600" dirty="0">
+                <a:solidFill>
+                  <a:srgbClr val="7030A0"/>
+                </a:solidFill>
+              </a:rPr>
+            </a:br>
+            <a:r>
+              <a:rPr lang="en-GB" sz="2000" dirty="0"/>
+              <a:t>The storage and </a:t>
+            </a:r>
+            <a:r>
+              <a:rPr lang="en-GB" sz="2000" dirty="0" err="1">
+                <a:solidFill>
+                  <a:schemeClr val="accent6">
+                    <a:lumMod val="75000"/>
+                  </a:schemeClr>
+                </a:solidFill>
+                <a:latin typeface="Courier New" panose="02070309020205020404" pitchFamily="49" charset="0"/>
+                <a:cs typeface="Courier New" panose="02070309020205020404" pitchFamily="49" charset="0"/>
+              </a:rPr>
+              <a:t>unique_references_contanter</a:t>
+            </a:r>
+            <a:r>
+              <a:rPr lang="en-GB" sz="2000" dirty="0">
+                <a:solidFill>
+                  <a:schemeClr val="accent6">
+                    <a:lumMod val="75000"/>
+                  </a:schemeClr>
+                </a:solidFill>
+                <a:latin typeface="Courier New" panose="02070309020205020404" pitchFamily="49" charset="0"/>
+                <a:cs typeface="Courier New" panose="02070309020205020404" pitchFamily="49" charset="0"/>
+              </a:rPr>
+              <a:t> </a:t>
+            </a:r>
+            <a:r>
+              <a:rPr lang="en-GB" sz="2000" dirty="0"/>
+              <a:t>are mixed together, despite having different purposes.</a:t>
+            </a:r>
+            <a:endParaRPr lang="en-GB" sz="3600" dirty="0">
+              <a:solidFill>
+                <a:srgbClr val="7030A0"/>
+              </a:solidFill>
+            </a:endParaRPr>
+          </a:p>
+        </p:txBody>
+      </p:sp>
+      <p:sp>
+        <p:nvSpPr>
+          <p:cNvPr id="10" name="Content Placeholder 9">
+            <a:extLst>
+              <a:ext uri="{FF2B5EF4-FFF2-40B4-BE49-F238E27FC236}">
+                <a16:creationId xmlns:a16="http://schemas.microsoft.com/office/drawing/2014/main" id="{AE0D1BE9-ED49-5580-E5E6-99B240780392}"/>
+              </a:ext>
+            </a:extLst>
+          </p:cNvPr>
+          <p:cNvSpPr>
+            <a:spLocks noGrp="1"/>
+          </p:cNvSpPr>
+          <p:nvPr>
+            <p:ph sz="half" idx="1"/>
+          </p:nvPr>
+        </p:nvSpPr>
+        <p:spPr>
+          <a:xfrm>
+            <a:off x="907907" y="1690688"/>
+            <a:ext cx="9937779" cy="2176413"/>
+          </a:xfrm>
+          <a:ln w="25400">
+            <a:solidFill>
+              <a:srgbClr val="C00000"/>
+            </a:solidFill>
+          </a:ln>
+        </p:spPr>
+        <p:txBody>
+          <a:bodyPr>
+            <a:normAutofit/>
+          </a:bodyPr>
+          <a:lstStyle/>
+          <a:p>
+            <a:pPr marL="0" indent="0">
+              <a:buNone/>
+            </a:pPr>
+            <a:r>
+              <a:rPr lang="en-GB" sz="1900" b="0" i="0" dirty="0" err="1">
+                <a:effectLst/>
+                <a:latin typeface="Courier New" panose="02070309020205020404" pitchFamily="49" charset="0"/>
+                <a:cs typeface="Courier New" panose="02070309020205020404" pitchFamily="49" charset="0"/>
+              </a:rPr>
+              <a:t>glcont</a:t>
+            </a:r>
+            <a:r>
+              <a:rPr lang="en-GB" sz="1900" b="0" i="0" dirty="0">
+                <a:effectLst/>
+                <a:latin typeface="Courier New" panose="02070309020205020404" pitchFamily="49" charset="0"/>
+                <a:cs typeface="Courier New" panose="02070309020205020404" pitchFamily="49" charset="0"/>
+              </a:rPr>
+              <a:t> = </a:t>
+            </a:r>
+            <a:r>
+              <a:rPr lang="en-GB" sz="1900" b="0" i="0" dirty="0" err="1">
+                <a:effectLst/>
+                <a:latin typeface="Courier New" panose="02070309020205020404" pitchFamily="49" charset="0"/>
+                <a:cs typeface="Courier New" panose="02070309020205020404" pitchFamily="49" charset="0"/>
+              </a:rPr>
+              <a:t>self.global_container</a:t>
+            </a:r>
+            <a:r>
+              <a:rPr lang="en-GB" sz="1900" b="0" i="0" dirty="0">
+                <a:effectLst/>
+                <a:latin typeface="Courier New" panose="02070309020205020404" pitchFamily="49" charset="0"/>
+                <a:cs typeface="Courier New" panose="02070309020205020404" pitchFamily="49" charset="0"/>
+              </a:rPr>
+              <a:t>(</a:t>
+            </a:r>
+            <a:r>
+              <a:rPr lang="en-GB" sz="1900" b="0" i="0" dirty="0">
+                <a:solidFill>
+                  <a:srgbClr val="A709F5"/>
+                </a:solidFill>
+                <a:effectLst/>
+                <a:latin typeface="Courier New" panose="02070309020205020404" pitchFamily="49" charset="0"/>
+                <a:cs typeface="Courier New" panose="02070309020205020404" pitchFamily="49" charset="0"/>
+              </a:rPr>
+              <a:t>'value'</a:t>
+            </a:r>
+            <a:r>
+              <a:rPr lang="en-GB" sz="1900" b="0" i="0" dirty="0">
+                <a:effectLst/>
+                <a:latin typeface="Courier New" panose="02070309020205020404" pitchFamily="49" charset="0"/>
+                <a:cs typeface="Courier New" panose="02070309020205020404" pitchFamily="49" charset="0"/>
+              </a:rPr>
+              <a:t>, </a:t>
+            </a:r>
+            <a:r>
+              <a:rPr lang="en-GB" sz="1900" b="0" i="0" dirty="0" err="1">
+                <a:effectLst/>
+                <a:latin typeface="Courier New" panose="02070309020205020404" pitchFamily="49" charset="0"/>
+                <a:cs typeface="Courier New" panose="02070309020205020404" pitchFamily="49" charset="0"/>
+              </a:rPr>
+              <a:t>self.global_name</a:t>
+            </a:r>
+            <a:r>
+              <a:rPr lang="en-GB" sz="1900" b="0" i="0" dirty="0">
+                <a:effectLst/>
+                <a:latin typeface="Courier New" panose="02070309020205020404" pitchFamily="49" charset="0"/>
+                <a:cs typeface="Courier New" panose="02070309020205020404" pitchFamily="49" charset="0"/>
+              </a:rPr>
+              <a:t>_);</a:t>
+            </a:r>
+          </a:p>
+          <a:p>
+            <a:pPr marL="0" indent="0">
+              <a:buNone/>
+            </a:pPr>
+            <a:r>
+              <a:rPr lang="en-GB" sz="1900" dirty="0">
+                <a:latin typeface="Courier New" panose="02070309020205020404" pitchFamily="49" charset="0"/>
+                <a:cs typeface="Courier New" panose="02070309020205020404" pitchFamily="49" charset="0"/>
+              </a:rPr>
+              <a:t>…</a:t>
+            </a:r>
+          </a:p>
+          <a:p>
+            <a:pPr marL="0" indent="0">
+              <a:buNone/>
+            </a:pPr>
+            <a:r>
+              <a:rPr lang="en-GB" sz="1900" b="0" i="0" dirty="0">
+                <a:effectLst/>
+                <a:latin typeface="Courier New" panose="02070309020205020404" pitchFamily="49" charset="0"/>
+                <a:cs typeface="Courier New" panose="02070309020205020404" pitchFamily="49" charset="0"/>
+              </a:rPr>
+              <a:t>…</a:t>
+            </a:r>
+          </a:p>
+          <a:p>
+            <a:pPr marL="0" indent="0">
+              <a:buNone/>
+            </a:pPr>
+            <a:r>
+              <a:rPr lang="en-GB" sz="1900" dirty="0">
+                <a:latin typeface="Courier New" panose="02070309020205020404" pitchFamily="49" charset="0"/>
+                <a:cs typeface="Courier New" panose="02070309020205020404" pitchFamily="49" charset="0"/>
+              </a:rPr>
+              <a:t>…</a:t>
+            </a:r>
+            <a:endParaRPr lang="en-GB" sz="1900" b="0" i="0" dirty="0">
+              <a:effectLst/>
+              <a:latin typeface="Courier New" panose="02070309020205020404" pitchFamily="49" charset="0"/>
+              <a:cs typeface="Courier New" panose="02070309020205020404" pitchFamily="49" charset="0"/>
+            </a:endParaRPr>
+          </a:p>
+          <a:p>
+            <a:pPr marL="0" indent="0">
+              <a:buNone/>
+            </a:pPr>
+            <a:r>
+              <a:rPr lang="en-GB" sz="1900" b="0" i="0" dirty="0" err="1">
+                <a:effectLst/>
+                <a:latin typeface="Courier New" panose="02070309020205020404" pitchFamily="49" charset="0"/>
+                <a:cs typeface="Courier New" panose="02070309020205020404" pitchFamily="49" charset="0"/>
+              </a:rPr>
+              <a:t>self.global_container</a:t>
+            </a:r>
+            <a:r>
+              <a:rPr lang="en-GB" sz="1900" b="0" i="0" dirty="0">
+                <a:effectLst/>
+                <a:latin typeface="Courier New" panose="02070309020205020404" pitchFamily="49" charset="0"/>
+                <a:cs typeface="Courier New" panose="02070309020205020404" pitchFamily="49" charset="0"/>
+              </a:rPr>
+              <a:t>(</a:t>
+            </a:r>
+            <a:r>
+              <a:rPr lang="en-GB" sz="1900" b="0" i="0" dirty="0">
+                <a:solidFill>
+                  <a:srgbClr val="A709F5"/>
+                </a:solidFill>
+                <a:effectLst/>
+                <a:latin typeface="Courier New" panose="02070309020205020404" pitchFamily="49" charset="0"/>
+                <a:cs typeface="Courier New" panose="02070309020205020404" pitchFamily="49" charset="0"/>
+              </a:rPr>
+              <a:t>'reset'</a:t>
+            </a:r>
+            <a:r>
+              <a:rPr lang="en-GB" sz="1900" b="0" i="0" dirty="0">
+                <a:effectLst/>
+                <a:latin typeface="Courier New" panose="02070309020205020404" pitchFamily="49" charset="0"/>
+                <a:cs typeface="Courier New" panose="02070309020205020404" pitchFamily="49" charset="0"/>
+              </a:rPr>
+              <a:t>,self.global_name_,</a:t>
+            </a:r>
+            <a:r>
+              <a:rPr lang="en-GB" sz="1900" b="0" i="0" dirty="0" err="1">
+                <a:effectLst/>
+                <a:latin typeface="Courier New" panose="02070309020205020404" pitchFamily="49" charset="0"/>
+                <a:cs typeface="Courier New" panose="02070309020205020404" pitchFamily="49" charset="0"/>
+              </a:rPr>
+              <a:t>glcont</a:t>
+            </a:r>
+            <a:r>
+              <a:rPr lang="en-GB" sz="1900" b="0" i="0" dirty="0">
+                <a:effectLst/>
+                <a:latin typeface="Courier New" panose="02070309020205020404" pitchFamily="49" charset="0"/>
+                <a:cs typeface="Courier New" panose="02070309020205020404" pitchFamily="49" charset="0"/>
+              </a:rPr>
+              <a:t>);</a:t>
+            </a:r>
+          </a:p>
+          <a:p>
+            <a:endParaRPr lang="en-GB" dirty="0"/>
+          </a:p>
+        </p:txBody>
+      </p:sp>
+      <p:sp>
+        <p:nvSpPr>
+          <p:cNvPr id="11" name="Content Placeholder 10">
+            <a:extLst>
+              <a:ext uri="{FF2B5EF4-FFF2-40B4-BE49-F238E27FC236}">
+                <a16:creationId xmlns:a16="http://schemas.microsoft.com/office/drawing/2014/main" id="{F2D48621-C553-D567-F028-D42AF4A8D0B2}"/>
+              </a:ext>
+            </a:extLst>
+          </p:cNvPr>
+          <p:cNvSpPr>
+            <a:spLocks noGrp="1"/>
+          </p:cNvSpPr>
+          <p:nvPr>
+            <p:ph sz="half" idx="2"/>
+          </p:nvPr>
+        </p:nvSpPr>
+        <p:spPr>
+          <a:xfrm>
+            <a:off x="907906" y="4231766"/>
+            <a:ext cx="9937779" cy="2401116"/>
+          </a:xfrm>
+          <a:ln w="25400">
+            <a:solidFill>
+              <a:srgbClr val="00B050"/>
+            </a:solidFill>
+          </a:ln>
+        </p:spPr>
+        <p:txBody>
+          <a:bodyPr>
+            <a:normAutofit/>
+          </a:bodyPr>
+          <a:lstStyle/>
+          <a:p>
+            <a:pPr marL="0" indent="0">
+              <a:buNone/>
+            </a:pPr>
+            <a:r>
+              <a:rPr lang="en-GB" sz="1900" dirty="0">
+                <a:latin typeface="Courier New" panose="02070309020205020404" pitchFamily="49" charset="0"/>
+                <a:cs typeface="Courier New" panose="02070309020205020404" pitchFamily="49" charset="0"/>
+              </a:rPr>
+              <a:t>storage = </a:t>
+            </a:r>
+            <a:r>
+              <a:rPr lang="en-GB" sz="1900" dirty="0" err="1">
+                <a:latin typeface="Courier New" panose="02070309020205020404" pitchFamily="49" charset="0"/>
+                <a:cs typeface="Courier New" panose="02070309020205020404" pitchFamily="49" charset="0"/>
+              </a:rPr>
+              <a:t>unique_obj_store.instance</a:t>
+            </a:r>
+            <a:r>
+              <a:rPr lang="en-GB" sz="1900" dirty="0">
+                <a:latin typeface="Courier New" panose="02070309020205020404" pitchFamily="49" charset="0"/>
+                <a:cs typeface="Courier New" panose="02070309020205020404" pitchFamily="49" charset="0"/>
+              </a:rPr>
+              <a:t>().</a:t>
+            </a:r>
+            <a:r>
+              <a:rPr lang="en-GB" sz="1900" b="1" dirty="0" err="1">
+                <a:latin typeface="Courier New" panose="02070309020205020404" pitchFamily="49" charset="0"/>
+                <a:cs typeface="Courier New" panose="02070309020205020404" pitchFamily="49" charset="0"/>
+              </a:rPr>
+              <a:t>get_objects</a:t>
+            </a:r>
+            <a:r>
+              <a:rPr lang="en-GB" sz="1900" dirty="0">
+                <a:latin typeface="Courier New" panose="02070309020205020404" pitchFamily="49" charset="0"/>
+                <a:cs typeface="Courier New" panose="02070309020205020404" pitchFamily="49" charset="0"/>
+              </a:rPr>
+              <a:t>(</a:t>
+            </a:r>
+            <a:r>
+              <a:rPr lang="en-GB" sz="1900" dirty="0" err="1">
+                <a:latin typeface="Courier New" panose="02070309020205020404" pitchFamily="49" charset="0"/>
+                <a:cs typeface="Courier New" panose="02070309020205020404" pitchFamily="49" charset="0"/>
+              </a:rPr>
+              <a:t>self.basename</a:t>
+            </a:r>
+            <a:r>
+              <a:rPr lang="en-GB" sz="1900" dirty="0">
+                <a:latin typeface="Courier New" panose="02070309020205020404" pitchFamily="49" charset="0"/>
+                <a:cs typeface="Courier New" panose="02070309020205020404" pitchFamily="49" charset="0"/>
+              </a:rPr>
+              <a:t>)</a:t>
+            </a:r>
+          </a:p>
+          <a:p>
+            <a:pPr marL="0" indent="0">
+              <a:buNone/>
+            </a:pPr>
+            <a:r>
+              <a:rPr lang="en-GB" sz="1900" dirty="0">
+                <a:latin typeface="Courier New" panose="02070309020205020404" pitchFamily="49" charset="0"/>
+                <a:cs typeface="Courier New" panose="02070309020205020404" pitchFamily="49" charset="0"/>
+              </a:rPr>
+              <a:t>…</a:t>
+            </a:r>
+          </a:p>
+          <a:p>
+            <a:pPr marL="0" indent="0">
+              <a:buNone/>
+            </a:pPr>
+            <a:r>
+              <a:rPr lang="en-GB" sz="1900" dirty="0">
+                <a:latin typeface="Courier New" panose="02070309020205020404" pitchFamily="49" charset="0"/>
+                <a:cs typeface="Courier New" panose="02070309020205020404" pitchFamily="49" charset="0"/>
+              </a:rPr>
+              <a:t>…</a:t>
+            </a:r>
+          </a:p>
+          <a:p>
+            <a:pPr marL="0" indent="0">
+              <a:buNone/>
+            </a:pPr>
+            <a:r>
+              <a:rPr lang="en-GB" sz="1900" dirty="0">
+                <a:latin typeface="Courier New" panose="02070309020205020404" pitchFamily="49" charset="0"/>
+                <a:cs typeface="Courier New" panose="02070309020205020404" pitchFamily="49" charset="0"/>
+              </a:rPr>
+              <a:t>…</a:t>
+            </a:r>
+          </a:p>
+          <a:p>
+            <a:pPr marL="0" indent="0">
+              <a:buNone/>
+            </a:pPr>
+            <a:r>
+              <a:rPr lang="en-GB" sz="1900" dirty="0" err="1">
+                <a:latin typeface="Courier New" panose="02070309020205020404" pitchFamily="49" charset="0"/>
+                <a:cs typeface="Courier New" panose="02070309020205020404" pitchFamily="49" charset="0"/>
+              </a:rPr>
+              <a:t>unique_obj_store.instance</a:t>
+            </a:r>
+            <a:r>
+              <a:rPr lang="en-GB" sz="1900" dirty="0">
+                <a:latin typeface="Courier New" panose="02070309020205020404" pitchFamily="49" charset="0"/>
+                <a:cs typeface="Courier New" panose="02070309020205020404" pitchFamily="49" charset="0"/>
+              </a:rPr>
+              <a:t>().</a:t>
+            </a:r>
+            <a:r>
+              <a:rPr lang="en-GB" sz="1900" b="1" dirty="0" err="1">
+                <a:latin typeface="Courier New" panose="02070309020205020404" pitchFamily="49" charset="0"/>
+                <a:cs typeface="Courier New" panose="02070309020205020404" pitchFamily="49" charset="0"/>
+              </a:rPr>
+              <a:t>set_objects</a:t>
+            </a:r>
+            <a:r>
+              <a:rPr lang="en-GB" sz="1900" dirty="0">
+                <a:latin typeface="Courier New" panose="02070309020205020404" pitchFamily="49" charset="0"/>
+                <a:cs typeface="Courier New" panose="02070309020205020404" pitchFamily="49" charset="0"/>
+              </a:rPr>
+              <a:t>(storage);</a:t>
+            </a:r>
+          </a:p>
+        </p:txBody>
+      </p:sp>
+      <p:sp>
+        <p:nvSpPr>
+          <p:cNvPr id="3" name="Rectangle 2">
+            <a:extLst>
+              <a:ext uri="{FF2B5EF4-FFF2-40B4-BE49-F238E27FC236}">
+                <a16:creationId xmlns:a16="http://schemas.microsoft.com/office/drawing/2014/main" id="{75ECFA10-50C7-5958-43CF-2021984F0DF9}"/>
+              </a:ext>
+            </a:extLst>
+          </p:cNvPr>
+          <p:cNvSpPr/>
+          <p:nvPr/>
+        </p:nvSpPr>
+        <p:spPr>
+          <a:xfrm>
+            <a:off x="7463736" y="2203967"/>
+            <a:ext cx="4344560" cy="812284"/>
+          </a:xfrm>
+          <a:prstGeom prst="rect">
+            <a:avLst/>
+          </a:prstGeom>
+          <a:solidFill>
+            <a:schemeClr val="bg1"/>
+          </a:solidFill>
+          <a:ln>
+            <a:solidFill>
+              <a:srgbClr val="0070C0"/>
+            </a:solidFill>
+          </a:ln>
+        </p:spPr>
+        <p:style>
+          <a:lnRef idx="2">
+            <a:schemeClr val="accent1">
+              <a:shade val="15000"/>
+            </a:schemeClr>
+          </a:lnRef>
+          <a:fillRef idx="1">
+            <a:schemeClr val="accent1"/>
+          </a:fillRef>
+          <a:effectRef idx="0">
+            <a:schemeClr val="accent1"/>
+          </a:effectRef>
+          <a:fontRef idx="minor">
+            <a:schemeClr val="lt1"/>
+          </a:fontRef>
+        </p:style>
+        <p:txBody>
+          <a:bodyPr rtlCol="0" anchor="ctr"/>
+          <a:lstStyle/>
+          <a:p>
+            <a:r>
+              <a:rPr lang="en-GB" dirty="0">
+                <a:solidFill>
+                  <a:schemeClr val="tx1"/>
+                </a:solidFill>
+              </a:rPr>
+              <a:t>Fields of the structure within static function in: </a:t>
+            </a:r>
+            <a:r>
+              <a:rPr lang="en-GB" dirty="0" err="1">
+                <a:solidFill>
+                  <a:schemeClr val="accent6">
+                    <a:lumMod val="75000"/>
+                  </a:schemeClr>
+                </a:solidFill>
+                <a:latin typeface="Courier New" panose="02070309020205020404" pitchFamily="49" charset="0"/>
+                <a:cs typeface="Courier New" panose="02070309020205020404" pitchFamily="49" charset="0"/>
+              </a:rPr>
+              <a:t>unique_references_container</a:t>
+            </a:r>
+            <a:endParaRPr lang="en-GB" dirty="0">
+              <a:solidFill>
+                <a:schemeClr val="accent6">
+                  <a:lumMod val="75000"/>
+                </a:schemeClr>
+              </a:solidFill>
+              <a:latin typeface="Courier New" panose="02070309020205020404" pitchFamily="49" charset="0"/>
+              <a:cs typeface="Courier New" panose="02070309020205020404" pitchFamily="49" charset="0"/>
+            </a:endParaRPr>
+          </a:p>
+        </p:txBody>
+      </p:sp>
+      <p:cxnSp>
+        <p:nvCxnSpPr>
+          <p:cNvPr id="6" name="Connector: Elbow 5">
+            <a:extLst>
+              <a:ext uri="{FF2B5EF4-FFF2-40B4-BE49-F238E27FC236}">
+                <a16:creationId xmlns:a16="http://schemas.microsoft.com/office/drawing/2014/main" id="{FCB491E9-A27C-BD42-EDD9-874C8DD6AB09}"/>
+              </a:ext>
+            </a:extLst>
+          </p:cNvPr>
+          <p:cNvCxnSpPr>
+            <a:cxnSpLocks/>
+            <a:stCxn id="3" idx="1"/>
+          </p:cNvCxnSpPr>
+          <p:nvPr/>
+        </p:nvCxnSpPr>
+        <p:spPr>
+          <a:xfrm rot="10800000">
+            <a:off x="5959852" y="2055355"/>
+            <a:ext cx="1503884" cy="554754"/>
+          </a:xfrm>
+          <a:prstGeom prst="bentConnector3">
+            <a:avLst>
+              <a:gd name="adj1" fmla="val 100000"/>
+            </a:avLst>
+          </a:prstGeom>
+          <a:ln>
+            <a:tailEnd type="triangle"/>
+          </a:ln>
+        </p:spPr>
+        <p:style>
+          <a:lnRef idx="2">
+            <a:schemeClr val="accent1"/>
+          </a:lnRef>
+          <a:fillRef idx="0">
+            <a:schemeClr val="accent1"/>
+          </a:fillRef>
+          <a:effectRef idx="1">
+            <a:schemeClr val="accent1"/>
+          </a:effectRef>
+          <a:fontRef idx="minor">
+            <a:schemeClr val="tx1"/>
+          </a:fontRef>
+        </p:style>
+      </p:cxnSp>
+      <p:cxnSp>
+        <p:nvCxnSpPr>
+          <p:cNvPr id="12" name="Connector: Elbow 11">
+            <a:extLst>
+              <a:ext uri="{FF2B5EF4-FFF2-40B4-BE49-F238E27FC236}">
+                <a16:creationId xmlns:a16="http://schemas.microsoft.com/office/drawing/2014/main" id="{03168BEE-FE76-55C5-0FFC-254EF91A8AA1}"/>
+              </a:ext>
+            </a:extLst>
+          </p:cNvPr>
+          <p:cNvCxnSpPr>
+            <a:cxnSpLocks/>
+          </p:cNvCxnSpPr>
+          <p:nvPr/>
+        </p:nvCxnSpPr>
+        <p:spPr>
+          <a:xfrm rot="10800000" flipV="1">
+            <a:off x="4572000" y="2610108"/>
+            <a:ext cx="2891736" cy="613065"/>
+          </a:xfrm>
+          <a:prstGeom prst="bentConnector3">
+            <a:avLst>
+              <a:gd name="adj1" fmla="val 100080"/>
+            </a:avLst>
+          </a:prstGeom>
+          <a:ln>
+            <a:tailEnd type="triangle"/>
+          </a:ln>
+        </p:spPr>
+        <p:style>
+          <a:lnRef idx="2">
+            <a:schemeClr val="accent1"/>
+          </a:lnRef>
+          <a:fillRef idx="0">
+            <a:schemeClr val="accent1"/>
+          </a:fillRef>
+          <a:effectRef idx="1">
+            <a:schemeClr val="accent1"/>
+          </a:effectRef>
+          <a:fontRef idx="minor">
+            <a:schemeClr val="tx1"/>
+          </a:fontRef>
+        </p:style>
+      </p:cxnSp>
+      <p:sp>
+        <p:nvSpPr>
+          <p:cNvPr id="21" name="Rectangle 20">
+            <a:extLst>
+              <a:ext uri="{FF2B5EF4-FFF2-40B4-BE49-F238E27FC236}">
+                <a16:creationId xmlns:a16="http://schemas.microsoft.com/office/drawing/2014/main" id="{0F2144C7-FFBA-B1AB-E67D-9DC98DB6B118}"/>
+              </a:ext>
+            </a:extLst>
+          </p:cNvPr>
+          <p:cNvSpPr/>
+          <p:nvPr/>
+        </p:nvSpPr>
+        <p:spPr>
+          <a:xfrm>
+            <a:off x="7889991" y="4786522"/>
+            <a:ext cx="3987926" cy="812284"/>
+          </a:xfrm>
+          <a:prstGeom prst="rect">
+            <a:avLst/>
+          </a:prstGeom>
+          <a:solidFill>
+            <a:schemeClr val="bg1"/>
+          </a:solidFill>
+          <a:ln>
+            <a:solidFill>
+              <a:srgbClr val="0070C0"/>
+            </a:solidFill>
+          </a:ln>
+        </p:spPr>
+        <p:style>
+          <a:lnRef idx="2">
+            <a:schemeClr val="accent1">
+              <a:shade val="15000"/>
+            </a:schemeClr>
+          </a:lnRef>
+          <a:fillRef idx="1">
+            <a:schemeClr val="accent1"/>
+          </a:fillRef>
+          <a:effectRef idx="0">
+            <a:schemeClr val="accent1"/>
+          </a:effectRef>
+          <a:fontRef idx="minor">
+            <a:schemeClr val="lt1"/>
+          </a:fontRef>
+        </p:style>
+        <p:txBody>
+          <a:bodyPr rtlCol="0" anchor="ctr"/>
+          <a:lstStyle/>
+          <a:p>
+            <a:r>
+              <a:rPr lang="en-GB" dirty="0">
+                <a:solidFill>
+                  <a:schemeClr val="tx1"/>
+                </a:solidFill>
+              </a:rPr>
+              <a:t>Methods of standard singleton class:</a:t>
+            </a:r>
+          </a:p>
+          <a:p>
+            <a:r>
+              <a:rPr lang="en-GB" dirty="0" err="1">
+                <a:solidFill>
+                  <a:schemeClr val="accent6">
+                    <a:lumMod val="75000"/>
+                  </a:schemeClr>
+                </a:solidFill>
+                <a:latin typeface="Courier New" panose="02070309020205020404" pitchFamily="49" charset="0"/>
+                <a:cs typeface="Courier New" panose="02070309020205020404" pitchFamily="49" charset="0"/>
+              </a:rPr>
+              <a:t>unique_obj_store</a:t>
+            </a:r>
+            <a:endParaRPr lang="en-GB" dirty="0">
+              <a:solidFill>
+                <a:schemeClr val="accent6">
+                  <a:lumMod val="75000"/>
+                </a:schemeClr>
+              </a:solidFill>
+              <a:latin typeface="Courier New" panose="02070309020205020404" pitchFamily="49" charset="0"/>
+              <a:cs typeface="Courier New" panose="02070309020205020404" pitchFamily="49" charset="0"/>
+            </a:endParaRPr>
+          </a:p>
+        </p:txBody>
+      </p:sp>
+      <p:cxnSp>
+        <p:nvCxnSpPr>
+          <p:cNvPr id="22" name="Connector: Elbow 21">
+            <a:extLst>
+              <a:ext uri="{FF2B5EF4-FFF2-40B4-BE49-F238E27FC236}">
+                <a16:creationId xmlns:a16="http://schemas.microsoft.com/office/drawing/2014/main" id="{A489B00F-1697-8088-825B-FCE8BC7356F1}"/>
+              </a:ext>
+            </a:extLst>
+          </p:cNvPr>
+          <p:cNvCxnSpPr>
+            <a:cxnSpLocks/>
+          </p:cNvCxnSpPr>
+          <p:nvPr/>
+        </p:nvCxnSpPr>
+        <p:spPr>
+          <a:xfrm rot="10800000">
+            <a:off x="6665373" y="4609133"/>
+            <a:ext cx="1224618" cy="607484"/>
+          </a:xfrm>
+          <a:prstGeom prst="bentConnector3">
+            <a:avLst>
+              <a:gd name="adj1" fmla="val 100410"/>
+            </a:avLst>
+          </a:prstGeom>
+          <a:ln>
+            <a:tailEnd type="triangle"/>
+          </a:ln>
+        </p:spPr>
+        <p:style>
+          <a:lnRef idx="2">
+            <a:schemeClr val="accent1"/>
+          </a:lnRef>
+          <a:fillRef idx="0">
+            <a:schemeClr val="accent1"/>
+          </a:fillRef>
+          <a:effectRef idx="1">
+            <a:schemeClr val="accent1"/>
+          </a:effectRef>
+          <a:fontRef idx="minor">
+            <a:schemeClr val="tx1"/>
+          </a:fontRef>
+        </p:style>
+      </p:cxnSp>
+      <p:cxnSp>
+        <p:nvCxnSpPr>
+          <p:cNvPr id="27" name="Connector: Elbow 26">
+            <a:extLst>
+              <a:ext uri="{FF2B5EF4-FFF2-40B4-BE49-F238E27FC236}">
+                <a16:creationId xmlns:a16="http://schemas.microsoft.com/office/drawing/2014/main" id="{57FDBDB3-49CD-403E-EBD3-8BEA2D4CF3C7}"/>
+              </a:ext>
+            </a:extLst>
+          </p:cNvPr>
+          <p:cNvCxnSpPr>
+            <a:cxnSpLocks/>
+          </p:cNvCxnSpPr>
+          <p:nvPr/>
+        </p:nvCxnSpPr>
+        <p:spPr>
+          <a:xfrm rot="10800000" flipV="1">
+            <a:off x="5245037" y="5216619"/>
+            <a:ext cx="2644955" cy="625654"/>
+          </a:xfrm>
+          <a:prstGeom prst="bentConnector3">
+            <a:avLst>
+              <a:gd name="adj1" fmla="val 100541"/>
+            </a:avLst>
+          </a:prstGeom>
+          <a:ln>
+            <a:tailEnd type="triangle"/>
+          </a:ln>
+        </p:spPr>
+        <p:style>
+          <a:lnRef idx="2">
+            <a:schemeClr val="accent1"/>
+          </a:lnRef>
+          <a:fillRef idx="0">
+            <a:schemeClr val="accent1"/>
+          </a:fillRef>
+          <a:effectRef idx="1">
+            <a:schemeClr val="accent1"/>
+          </a:effectRef>
+          <a:fontRef idx="minor">
+            <a:schemeClr val="tx1"/>
+          </a:fontRef>
+        </p:style>
+      </p:cxnSp>
+    </p:spTree>
+    <p:extLst>
+      <p:ext uri="{BB962C8B-B14F-4D97-AF65-F5344CB8AC3E}">
+        <p14:creationId xmlns:p14="http://schemas.microsoft.com/office/powerpoint/2010/main" val="34684478"/>
+      </p:ext>
+    </p:extLst>
+  </p:cSld>
+  <p:clrMapOvr>
+    <a:masterClrMapping/>
+  </p:clrMapOvr>
+</p:sld>
+</file>
+
+<file path=ppt/slides/slide21.xml><?xml version="1.0" encoding="utf-8"?>
+<p:sld xmlns:a="http://schemas.openxmlformats.org/drawingml/2006/main" xmlns:r="http://schemas.openxmlformats.org/officeDocument/2006/relationships" xmlns:p="http://schemas.openxmlformats.org/presentationml/2006/main">
+  <p:cSld>
+    <p:spTree>
+      <p:nvGrpSpPr>
         <p:cNvPr id="1" name=""/>
         <p:cNvGrpSpPr/>
         <p:nvPr/>
@@ -16444,7 +17184,7 @@
 </p:sld>
 </file>
 
-<file path=ppt/slides/slide21.xml><?xml version="1.0" encoding="utf-8"?>
+<file path=ppt/slides/slide22.xml><?xml version="1.0" encoding="utf-8"?>
 <p:sld xmlns:a="http://schemas.openxmlformats.org/drawingml/2006/main" xmlns:r="http://schemas.openxmlformats.org/officeDocument/2006/relationships" xmlns:p="http://schemas.openxmlformats.org/presentationml/2006/main">
   <p:cSld>
     <p:spTree>
@@ -22353,7 +23093,7 @@
 </p:sld>
 </file>
 
-<file path=ppt/slides/slide22.xml><?xml version="1.0" encoding="utf-8"?>
+<file path=ppt/slides/slide23.xml><?xml version="1.0" encoding="utf-8"?>
 <p:sld xmlns:a="http://schemas.openxmlformats.org/drawingml/2006/main" xmlns:r="http://schemas.openxmlformats.org/officeDocument/2006/relationships" xmlns:p="http://schemas.openxmlformats.org/presentationml/2006/main">
   <p:cSld>
     <p:spTree>
@@ -23521,7 +24261,7 @@
 </p:sld>
 </file>
 
-<file path=ppt/slides/slide23.xml><?xml version="1.0" encoding="utf-8"?>
+<file path=ppt/slides/slide24.xml><?xml version="1.0" encoding="utf-8"?>
 <p:sld xmlns:a="http://schemas.openxmlformats.org/drawingml/2006/main" xmlns:r="http://schemas.openxmlformats.org/officeDocument/2006/relationships" xmlns:p="http://schemas.openxmlformats.org/presentationml/2006/main">
   <p:cSld>
     <p:spTree>
@@ -23919,7 +24659,7 @@
 </p:sld>
 </file>
 
-<file path=ppt/slides/slide24.xml><?xml version="1.0" encoding="utf-8"?>
+<file path=ppt/slides/slide25.xml><?xml version="1.0" encoding="utf-8"?>
 <p:sld xmlns:a="http://schemas.openxmlformats.org/drawingml/2006/main" xmlns:r="http://schemas.openxmlformats.org/officeDocument/2006/relationships" xmlns:p="http://schemas.openxmlformats.org/presentationml/2006/main">
   <p:cSld>
     <p:spTree>
@@ -24973,7 +25713,7 @@
 </p:sld>
 </file>
 
-<file path=ppt/slides/slide25.xml><?xml version="1.0" encoding="utf-8"?>
+<file path=ppt/slides/slide26.xml><?xml version="1.0" encoding="utf-8"?>
 <p:sld xmlns:a="http://schemas.openxmlformats.org/drawingml/2006/main" xmlns:r="http://schemas.openxmlformats.org/officeDocument/2006/relationships" xmlns:p="http://schemas.openxmlformats.org/presentationml/2006/main">
   <p:cSld>
     <p:spTree>

</xml_diff>

<commit_message>
Re #1802 more minor comments/changes
</commit_message>
<xml_diff>
--- a/documentation/presentations/Large_number_of_small_cuts.pptx
+++ b/documentation/presentations/Large_number_of_small_cuts.pptx
@@ -30376,7 +30376,9 @@
             <a:r>
               <a:rPr lang="en-GB" sz="2000" dirty="0">
                 <a:solidFill>
-                  <a:srgbClr val="0066FF"/>
+                  <a:schemeClr val="accent2">
+                    <a:lumMod val="75000"/>
+                  </a:schemeClr>
                 </a:solidFill>
               </a:rPr>
               <a:t>Code testability</a:t>
@@ -30410,6 +30412,232 @@
           </a:p>
         </p:txBody>
       </p:sp>
+      <p:grpSp>
+        <p:nvGrpSpPr>
+          <p:cNvPr id="15" name="Group 14">
+            <a:extLst>
+              <a:ext uri="{FF2B5EF4-FFF2-40B4-BE49-F238E27FC236}">
+                <a16:creationId xmlns:a16="http://schemas.microsoft.com/office/drawing/2014/main" id="{AA5A4BF1-7A27-BF82-C494-DE6E5DD5BE0C}"/>
+              </a:ext>
+            </a:extLst>
+          </p:cNvPr>
+          <p:cNvGrpSpPr/>
+          <p:nvPr/>
+        </p:nvGrpSpPr>
+        <p:grpSpPr>
+          <a:xfrm>
+            <a:off x="10006552" y="2644219"/>
+            <a:ext cx="1695754" cy="356045"/>
+            <a:chOff x="10001839" y="1334207"/>
+            <a:chExt cx="1695754" cy="440575"/>
+          </a:xfrm>
+        </p:grpSpPr>
+        <p:sp>
+          <p:nvSpPr>
+            <p:cNvPr id="9" name="Arc 8">
+              <a:extLst>
+                <a:ext uri="{FF2B5EF4-FFF2-40B4-BE49-F238E27FC236}">
+                  <a16:creationId xmlns:a16="http://schemas.microsoft.com/office/drawing/2014/main" id="{597637AC-D50F-235A-8DEE-354312E57269}"/>
+                </a:ext>
+              </a:extLst>
+            </p:cNvPr>
+            <p:cNvSpPr/>
+            <p:nvPr/>
+          </p:nvSpPr>
+          <p:spPr>
+            <a:xfrm>
+              <a:off x="11269487" y="1334207"/>
+              <a:ext cx="428106" cy="440575"/>
+            </a:xfrm>
+            <a:prstGeom prst="arc">
+              <a:avLst>
+                <a:gd name="adj1" fmla="val 16312464"/>
+                <a:gd name="adj2" fmla="val 6198517"/>
+              </a:avLst>
+            </a:prstGeom>
+            <a:ln>
+              <a:headEnd type="none"/>
+              <a:tailEnd type="stealth"/>
+            </a:ln>
+          </p:spPr>
+          <p:style>
+            <a:lnRef idx="2">
+              <a:schemeClr val="accent1"/>
+            </a:lnRef>
+            <a:fillRef idx="0">
+              <a:schemeClr val="accent1"/>
+            </a:fillRef>
+            <a:effectRef idx="1">
+              <a:schemeClr val="accent1"/>
+            </a:effectRef>
+            <a:fontRef idx="minor">
+              <a:schemeClr val="tx1"/>
+            </a:fontRef>
+          </p:style>
+          <p:txBody>
+            <a:bodyPr rtlCol="0" anchor="ctr"/>
+            <a:lstStyle/>
+            <a:p>
+              <a:pPr algn="ctr"/>
+              <a:endParaRPr lang="en-GB" dirty="0"/>
+            </a:p>
+          </p:txBody>
+        </p:sp>
+        <p:cxnSp>
+          <p:nvCxnSpPr>
+            <p:cNvPr id="12" name="Straight Arrow Connector 11">
+              <a:extLst>
+                <a:ext uri="{FF2B5EF4-FFF2-40B4-BE49-F238E27FC236}">
+                  <a16:creationId xmlns:a16="http://schemas.microsoft.com/office/drawing/2014/main" id="{709C3D01-485A-0001-651B-287CADBF6FB6}"/>
+                </a:ext>
+              </a:extLst>
+            </p:cNvPr>
+            <p:cNvCxnSpPr>
+              <a:stCxn id="9" idx="0"/>
+            </p:cNvCxnSpPr>
+            <p:nvPr/>
+          </p:nvCxnSpPr>
+          <p:spPr>
+            <a:xfrm flipH="1" flipV="1">
+              <a:off x="10001839" y="1334207"/>
+              <a:ext cx="1488906" cy="125"/>
+            </a:xfrm>
+            <a:prstGeom prst="straightConnector1">
+              <a:avLst/>
+            </a:prstGeom>
+            <a:ln>
+              <a:tailEnd type="triangle"/>
+            </a:ln>
+          </p:spPr>
+          <p:style>
+            <a:lnRef idx="2">
+              <a:schemeClr val="accent1"/>
+            </a:lnRef>
+            <a:fillRef idx="0">
+              <a:schemeClr val="accent1"/>
+            </a:fillRef>
+            <a:effectRef idx="1">
+              <a:schemeClr val="accent1"/>
+            </a:effectRef>
+            <a:fontRef idx="minor">
+              <a:schemeClr val="tx1"/>
+            </a:fontRef>
+          </p:style>
+        </p:cxnSp>
+      </p:grpSp>
+      <p:grpSp>
+        <p:nvGrpSpPr>
+          <p:cNvPr id="16" name="Group 15">
+            <a:extLst>
+              <a:ext uri="{FF2B5EF4-FFF2-40B4-BE49-F238E27FC236}">
+                <a16:creationId xmlns:a16="http://schemas.microsoft.com/office/drawing/2014/main" id="{286366EF-393A-DE79-7217-16B586B92F08}"/>
+              </a:ext>
+            </a:extLst>
+          </p:cNvPr>
+          <p:cNvGrpSpPr/>
+          <p:nvPr/>
+        </p:nvGrpSpPr>
+        <p:grpSpPr>
+          <a:xfrm>
+            <a:off x="9503789" y="3856522"/>
+            <a:ext cx="1695754" cy="356045"/>
+            <a:chOff x="10001839" y="1334207"/>
+            <a:chExt cx="1695754" cy="440575"/>
+          </a:xfrm>
+        </p:grpSpPr>
+        <p:sp>
+          <p:nvSpPr>
+            <p:cNvPr id="17" name="Arc 16">
+              <a:extLst>
+                <a:ext uri="{FF2B5EF4-FFF2-40B4-BE49-F238E27FC236}">
+                  <a16:creationId xmlns:a16="http://schemas.microsoft.com/office/drawing/2014/main" id="{ACD48E07-CB47-C152-2E66-28131D1D09E7}"/>
+                </a:ext>
+              </a:extLst>
+            </p:cNvPr>
+            <p:cNvSpPr/>
+            <p:nvPr/>
+          </p:nvSpPr>
+          <p:spPr>
+            <a:xfrm>
+              <a:off x="11269487" y="1334207"/>
+              <a:ext cx="428106" cy="440575"/>
+            </a:xfrm>
+            <a:prstGeom prst="arc">
+              <a:avLst>
+                <a:gd name="adj1" fmla="val 16312464"/>
+                <a:gd name="adj2" fmla="val 6198517"/>
+              </a:avLst>
+            </a:prstGeom>
+            <a:ln>
+              <a:headEnd type="none"/>
+              <a:tailEnd type="stealth"/>
+            </a:ln>
+          </p:spPr>
+          <p:style>
+            <a:lnRef idx="2">
+              <a:schemeClr val="accent1"/>
+            </a:lnRef>
+            <a:fillRef idx="0">
+              <a:schemeClr val="accent1"/>
+            </a:fillRef>
+            <a:effectRef idx="1">
+              <a:schemeClr val="accent1"/>
+            </a:effectRef>
+            <a:fontRef idx="minor">
+              <a:schemeClr val="tx1"/>
+            </a:fontRef>
+          </p:style>
+          <p:txBody>
+            <a:bodyPr rtlCol="0" anchor="ctr"/>
+            <a:lstStyle/>
+            <a:p>
+              <a:pPr algn="ctr"/>
+              <a:endParaRPr lang="en-GB" dirty="0"/>
+            </a:p>
+          </p:txBody>
+        </p:sp>
+        <p:cxnSp>
+          <p:nvCxnSpPr>
+            <p:cNvPr id="18" name="Straight Arrow Connector 17">
+              <a:extLst>
+                <a:ext uri="{FF2B5EF4-FFF2-40B4-BE49-F238E27FC236}">
+                  <a16:creationId xmlns:a16="http://schemas.microsoft.com/office/drawing/2014/main" id="{1DD98726-AAD3-4F6E-A916-1E32099B98C9}"/>
+                </a:ext>
+              </a:extLst>
+            </p:cNvPr>
+            <p:cNvCxnSpPr>
+              <a:stCxn id="17" idx="0"/>
+            </p:cNvCxnSpPr>
+            <p:nvPr/>
+          </p:nvCxnSpPr>
+          <p:spPr>
+            <a:xfrm flipH="1" flipV="1">
+              <a:off x="10001839" y="1334207"/>
+              <a:ext cx="1488906" cy="125"/>
+            </a:xfrm>
+            <a:prstGeom prst="straightConnector1">
+              <a:avLst/>
+            </a:prstGeom>
+            <a:ln>
+              <a:tailEnd type="triangle"/>
+            </a:ln>
+          </p:spPr>
+          <p:style>
+            <a:lnRef idx="2">
+              <a:schemeClr val="accent1"/>
+            </a:lnRef>
+            <a:fillRef idx="0">
+              <a:schemeClr val="accent1"/>
+            </a:fillRef>
+            <a:effectRef idx="1">
+              <a:schemeClr val="accent1"/>
+            </a:effectRef>
+            <a:fontRef idx="minor">
+              <a:schemeClr val="tx1"/>
+            </a:fontRef>
+          </p:style>
+        </p:cxnSp>
+      </p:grpSp>
     </p:spTree>
     <p:extLst>
       <p:ext uri="{BB962C8B-B14F-4D97-AF65-F5344CB8AC3E}">

</xml_diff>